<commit_message>
Finished ch 4 methods and results lots of figs
</commit_message>
<xml_diff>
--- a/DEBkiss results/Figure 1 chapter 4.pptx
+++ b/DEBkiss results/Figure 1 chapter 4.pptx
@@ -2,19 +2,19 @@
 <file path=ppt/presentation.xml><?xml version="1.0" encoding="utf-8"?>
 <p:presentation xmlns:a="http://schemas.openxmlformats.org/drawingml/2006/main" xmlns:r="http://schemas.openxmlformats.org/officeDocument/2006/relationships" xmlns:p="http://schemas.openxmlformats.org/presentationml/2006/main" saveSubsetFonts="1">
   <p:sldMasterIdLst>
-    <p:sldMasterId id="2147483648" r:id="rId1"/>
+    <p:sldMasterId id="2147483660" r:id="rId1"/>
   </p:sldMasterIdLst>
   <p:sldIdLst>
     <p:sldId id="256" r:id="rId2"/>
     <p:sldId id="257" r:id="rId3"/>
   </p:sldIdLst>
-  <p:sldSz cx="12192000" cy="6858000"/>
+  <p:sldSz cx="18288000" cy="6858000"/>
   <p:notesSz cx="6858000" cy="9144000"/>
   <p:defaultTextStyle>
     <a:defPPr>
       <a:defRPr lang="en-US"/>
     </a:defPPr>
-    <a:lvl1pPr marL="0" algn="l" defTabSz="914400" rtl="0" eaLnBrk="1" latinLnBrk="0" hangingPunct="1">
+    <a:lvl1pPr marL="0" algn="l" defTabSz="457200" rtl="0" eaLnBrk="1" latinLnBrk="0" hangingPunct="1">
       <a:defRPr sz="1800" kern="1200">
         <a:solidFill>
           <a:schemeClr val="tx1"/>
@@ -24,7 +24,7 @@
         <a:cs typeface="+mn-cs"/>
       </a:defRPr>
     </a:lvl1pPr>
-    <a:lvl2pPr marL="457200" algn="l" defTabSz="914400" rtl="0" eaLnBrk="1" latinLnBrk="0" hangingPunct="1">
+    <a:lvl2pPr marL="457200" algn="l" defTabSz="457200" rtl="0" eaLnBrk="1" latinLnBrk="0" hangingPunct="1">
       <a:defRPr sz="1800" kern="1200">
         <a:solidFill>
           <a:schemeClr val="tx1"/>
@@ -34,7 +34,7 @@
         <a:cs typeface="+mn-cs"/>
       </a:defRPr>
     </a:lvl2pPr>
-    <a:lvl3pPr marL="914400" algn="l" defTabSz="914400" rtl="0" eaLnBrk="1" latinLnBrk="0" hangingPunct="1">
+    <a:lvl3pPr marL="914400" algn="l" defTabSz="457200" rtl="0" eaLnBrk="1" latinLnBrk="0" hangingPunct="1">
       <a:defRPr sz="1800" kern="1200">
         <a:solidFill>
           <a:schemeClr val="tx1"/>
@@ -44,7 +44,7 @@
         <a:cs typeface="+mn-cs"/>
       </a:defRPr>
     </a:lvl3pPr>
-    <a:lvl4pPr marL="1371600" algn="l" defTabSz="914400" rtl="0" eaLnBrk="1" latinLnBrk="0" hangingPunct="1">
+    <a:lvl4pPr marL="1371600" algn="l" defTabSz="457200" rtl="0" eaLnBrk="1" latinLnBrk="0" hangingPunct="1">
       <a:defRPr sz="1800" kern="1200">
         <a:solidFill>
           <a:schemeClr val="tx1"/>
@@ -54,7 +54,7 @@
         <a:cs typeface="+mn-cs"/>
       </a:defRPr>
     </a:lvl4pPr>
-    <a:lvl5pPr marL="1828800" algn="l" defTabSz="914400" rtl="0" eaLnBrk="1" latinLnBrk="0" hangingPunct="1">
+    <a:lvl5pPr marL="1828800" algn="l" defTabSz="457200" rtl="0" eaLnBrk="1" latinLnBrk="0" hangingPunct="1">
       <a:defRPr sz="1800" kern="1200">
         <a:solidFill>
           <a:schemeClr val="tx1"/>
@@ -64,7 +64,7 @@
         <a:cs typeface="+mn-cs"/>
       </a:defRPr>
     </a:lvl5pPr>
-    <a:lvl6pPr marL="2286000" algn="l" defTabSz="914400" rtl="0" eaLnBrk="1" latinLnBrk="0" hangingPunct="1">
+    <a:lvl6pPr marL="2286000" algn="l" defTabSz="457200" rtl="0" eaLnBrk="1" latinLnBrk="0" hangingPunct="1">
       <a:defRPr sz="1800" kern="1200">
         <a:solidFill>
           <a:schemeClr val="tx1"/>
@@ -74,7 +74,7 @@
         <a:cs typeface="+mn-cs"/>
       </a:defRPr>
     </a:lvl6pPr>
-    <a:lvl7pPr marL="2743200" algn="l" defTabSz="914400" rtl="0" eaLnBrk="1" latinLnBrk="0" hangingPunct="1">
+    <a:lvl7pPr marL="2743200" algn="l" defTabSz="457200" rtl="0" eaLnBrk="1" latinLnBrk="0" hangingPunct="1">
       <a:defRPr sz="1800" kern="1200">
         <a:solidFill>
           <a:schemeClr val="tx1"/>
@@ -84,7 +84,7 @@
         <a:cs typeface="+mn-cs"/>
       </a:defRPr>
     </a:lvl7pPr>
-    <a:lvl8pPr marL="3200400" algn="l" defTabSz="914400" rtl="0" eaLnBrk="1" latinLnBrk="0" hangingPunct="1">
+    <a:lvl8pPr marL="3200400" algn="l" defTabSz="457200" rtl="0" eaLnBrk="1" latinLnBrk="0" hangingPunct="1">
       <a:defRPr sz="1800" kern="1200">
         <a:solidFill>
           <a:schemeClr val="tx1"/>
@@ -94,7 +94,7 @@
         <a:cs typeface="+mn-cs"/>
       </a:defRPr>
     </a:lvl8pPr>
-    <a:lvl9pPr marL="3657600" algn="l" defTabSz="914400" rtl="0" eaLnBrk="1" latinLnBrk="0" hangingPunct="1">
+    <a:lvl9pPr marL="3657600" algn="l" defTabSz="457200" rtl="0" eaLnBrk="1" latinLnBrk="0" hangingPunct="1">
       <a:defRPr sz="1800" kern="1200">
         <a:solidFill>
           <a:schemeClr val="tx1"/>
@@ -105,6 +105,11 @@
       </a:defRPr>
     </a:lvl9pPr>
   </p:defaultTextStyle>
+  <p:extLst>
+    <p:ext uri="{EFAFB233-063F-42B5-8137-9DF3F51BA10A}">
+      <p15:sldGuideLst xmlns:p15="http://schemas.microsoft.com/office/powerpoint/2012/main"/>
+    </p:ext>
+  </p:extLst>
 </p:presentation>
 </file>
 
@@ -5809,13 +5814,7 @@
       </p:grpSpPr>
       <p:sp>
         <p:nvSpPr>
-          <p:cNvPr id="2" name="Title 1">
-            <a:extLst>
-              <a:ext uri="{FF2B5EF4-FFF2-40B4-BE49-F238E27FC236}">
-                <a16:creationId xmlns:a16="http://schemas.microsoft.com/office/drawing/2014/main" id="{48B8AC06-85E1-8B4F-5676-D6D80AA17393}"/>
-              </a:ext>
-            </a:extLst>
-          </p:cNvPr>
+          <p:cNvPr id="2" name="Title 1"/>
           <p:cNvSpPr>
             <a:spLocks noGrp="1"/>
           </p:cNvSpPr>
@@ -5825,8 +5824,8 @@
         </p:nvSpPr>
         <p:spPr>
           <a:xfrm>
-            <a:off x="1524000" y="1122363"/>
-            <a:ext cx="9144000" cy="2387600"/>
+            <a:off x="2286000" y="1122363"/>
+            <a:ext cx="13716000" cy="2387600"/>
           </a:xfrm>
         </p:spPr>
         <p:txBody>
@@ -5841,18 +5840,13 @@
               <a:rPr lang="en-US"/>
               <a:t>Click to edit Master title style</a:t>
             </a:r>
+            <a:endParaRPr lang="en-US" dirty="0"/>
           </a:p>
         </p:txBody>
       </p:sp>
       <p:sp>
         <p:nvSpPr>
-          <p:cNvPr id="3" name="Subtitle 2">
-            <a:extLst>
-              <a:ext uri="{FF2B5EF4-FFF2-40B4-BE49-F238E27FC236}">
-                <a16:creationId xmlns:a16="http://schemas.microsoft.com/office/drawing/2014/main" id="{613126F4-74E5-C8C0-AAA5-74503F92F8FF}"/>
-              </a:ext>
-            </a:extLst>
-          </p:cNvPr>
+          <p:cNvPr id="3" name="Subtitle 2"/>
           <p:cNvSpPr>
             <a:spLocks noGrp="1"/>
           </p:cNvSpPr>
@@ -5862,8 +5856,8 @@
         </p:nvSpPr>
         <p:spPr>
           <a:xfrm>
-            <a:off x="1524000" y="3602038"/>
-            <a:ext cx="9144000" cy="1655762"/>
+            <a:off x="2286000" y="3602038"/>
+            <a:ext cx="13716000" cy="1655762"/>
           </a:xfrm>
         </p:spPr>
         <p:txBody>
@@ -5911,18 +5905,13 @@
               <a:rPr lang="en-US"/>
               <a:t>Click to edit Master subtitle style</a:t>
             </a:r>
+            <a:endParaRPr lang="en-US" dirty="0"/>
           </a:p>
         </p:txBody>
       </p:sp>
       <p:sp>
         <p:nvSpPr>
-          <p:cNvPr id="4" name="Date Placeholder 3">
-            <a:extLst>
-              <a:ext uri="{FF2B5EF4-FFF2-40B4-BE49-F238E27FC236}">
-                <a16:creationId xmlns:a16="http://schemas.microsoft.com/office/drawing/2014/main" id="{108DFDFE-77A1-BEC6-C9AF-24E00D6564C7}"/>
-              </a:ext>
-            </a:extLst>
-          </p:cNvPr>
+          <p:cNvPr id="4" name="Date Placeholder 3"/>
           <p:cNvSpPr>
             <a:spLocks noGrp="1"/>
           </p:cNvSpPr>
@@ -5937,7 +5926,7 @@
           <a:p>
             <a:fld id="{B6C7B70F-B9BD-40CD-A497-1FA080680CDD}" type="datetimeFigureOut">
               <a:rPr lang="en-US" smtClean="0"/>
-              <a:t>3/2/2023</a:t>
+              <a:t>3/22/2023</a:t>
             </a:fld>
             <a:endParaRPr lang="en-US"/>
           </a:p>
@@ -5945,13 +5934,7 @@
       </p:sp>
       <p:sp>
         <p:nvSpPr>
-          <p:cNvPr id="5" name="Footer Placeholder 4">
-            <a:extLst>
-              <a:ext uri="{FF2B5EF4-FFF2-40B4-BE49-F238E27FC236}">
-                <a16:creationId xmlns:a16="http://schemas.microsoft.com/office/drawing/2014/main" id="{48E0A01B-2076-8F9E-5755-A2FEED952603}"/>
-              </a:ext>
-            </a:extLst>
-          </p:cNvPr>
+          <p:cNvPr id="5" name="Footer Placeholder 4"/>
           <p:cNvSpPr>
             <a:spLocks noGrp="1"/>
           </p:cNvSpPr>
@@ -5970,13 +5953,7 @@
       </p:sp>
       <p:sp>
         <p:nvSpPr>
-          <p:cNvPr id="6" name="Slide Number Placeholder 5">
-            <a:extLst>
-              <a:ext uri="{FF2B5EF4-FFF2-40B4-BE49-F238E27FC236}">
-                <a16:creationId xmlns:a16="http://schemas.microsoft.com/office/drawing/2014/main" id="{603F41B0-200B-81D9-B459-3BF9289FA821}"/>
-              </a:ext>
-            </a:extLst>
-          </p:cNvPr>
+          <p:cNvPr id="6" name="Slide Number Placeholder 5"/>
           <p:cNvSpPr>
             <a:spLocks noGrp="1"/>
           </p:cNvSpPr>
@@ -6000,7 +5977,7 @@
     </p:spTree>
     <p:extLst>
       <p:ext uri="{BB962C8B-B14F-4D97-AF65-F5344CB8AC3E}">
-        <p14:creationId xmlns:p14="http://schemas.microsoft.com/office/powerpoint/2010/main" val="4102451319"/>
+        <p14:creationId xmlns:p14="http://schemas.microsoft.com/office/powerpoint/2010/main" val="1877346897"/>
       </p:ext>
     </p:extLst>
   </p:cSld>
@@ -6029,13 +6006,7 @@
       </p:grpSpPr>
       <p:sp>
         <p:nvSpPr>
-          <p:cNvPr id="2" name="Title 1">
-            <a:extLst>
-              <a:ext uri="{FF2B5EF4-FFF2-40B4-BE49-F238E27FC236}">
-                <a16:creationId xmlns:a16="http://schemas.microsoft.com/office/drawing/2014/main" id="{128A1674-36C9-52A7-FE1B-9A0D3C980539}"/>
-              </a:ext>
-            </a:extLst>
-          </p:cNvPr>
+          <p:cNvPr id="2" name="Title 1"/>
           <p:cNvSpPr>
             <a:spLocks noGrp="1"/>
           </p:cNvSpPr>
@@ -6052,18 +6023,13 @@
               <a:rPr lang="en-US"/>
               <a:t>Click to edit Master title style</a:t>
             </a:r>
+            <a:endParaRPr lang="en-US" dirty="0"/>
           </a:p>
         </p:txBody>
       </p:sp>
       <p:sp>
         <p:nvSpPr>
-          <p:cNvPr id="3" name="Vertical Text Placeholder 2">
-            <a:extLst>
-              <a:ext uri="{FF2B5EF4-FFF2-40B4-BE49-F238E27FC236}">
-                <a16:creationId xmlns:a16="http://schemas.microsoft.com/office/drawing/2014/main" id="{5C3F32DD-5C70-D8E9-E548-F34B18A08CF1}"/>
-              </a:ext>
-            </a:extLst>
-          </p:cNvPr>
+          <p:cNvPr id="3" name="Vertical Text Placeholder 2"/>
           <p:cNvSpPr>
             <a:spLocks noGrp="1"/>
           </p:cNvSpPr>
@@ -6109,18 +6075,13 @@
               <a:rPr lang="en-US"/>
               <a:t>Fifth level</a:t>
             </a:r>
+            <a:endParaRPr lang="en-US" dirty="0"/>
           </a:p>
         </p:txBody>
       </p:sp>
       <p:sp>
         <p:nvSpPr>
-          <p:cNvPr id="4" name="Date Placeholder 3">
-            <a:extLst>
-              <a:ext uri="{FF2B5EF4-FFF2-40B4-BE49-F238E27FC236}">
-                <a16:creationId xmlns:a16="http://schemas.microsoft.com/office/drawing/2014/main" id="{4F467FAA-7CC9-23FB-EBA5-4A829A4F3B7A}"/>
-              </a:ext>
-            </a:extLst>
-          </p:cNvPr>
+          <p:cNvPr id="4" name="Date Placeholder 3"/>
           <p:cNvSpPr>
             <a:spLocks noGrp="1"/>
           </p:cNvSpPr>
@@ -6135,7 +6096,7 @@
           <a:p>
             <a:fld id="{B6C7B70F-B9BD-40CD-A497-1FA080680CDD}" type="datetimeFigureOut">
               <a:rPr lang="en-US" smtClean="0"/>
-              <a:t>3/2/2023</a:t>
+              <a:t>3/22/2023</a:t>
             </a:fld>
             <a:endParaRPr lang="en-US"/>
           </a:p>
@@ -6143,13 +6104,7 @@
       </p:sp>
       <p:sp>
         <p:nvSpPr>
-          <p:cNvPr id="5" name="Footer Placeholder 4">
-            <a:extLst>
-              <a:ext uri="{FF2B5EF4-FFF2-40B4-BE49-F238E27FC236}">
-                <a16:creationId xmlns:a16="http://schemas.microsoft.com/office/drawing/2014/main" id="{E928F677-7687-CEA0-4203-CB2F609767EF}"/>
-              </a:ext>
-            </a:extLst>
-          </p:cNvPr>
+          <p:cNvPr id="5" name="Footer Placeholder 4"/>
           <p:cNvSpPr>
             <a:spLocks noGrp="1"/>
           </p:cNvSpPr>
@@ -6168,13 +6123,7 @@
       </p:sp>
       <p:sp>
         <p:nvSpPr>
-          <p:cNvPr id="6" name="Slide Number Placeholder 5">
-            <a:extLst>
-              <a:ext uri="{FF2B5EF4-FFF2-40B4-BE49-F238E27FC236}">
-                <a16:creationId xmlns:a16="http://schemas.microsoft.com/office/drawing/2014/main" id="{035D1F90-AD63-17FA-1514-42490A16A53F}"/>
-              </a:ext>
-            </a:extLst>
-          </p:cNvPr>
+          <p:cNvPr id="6" name="Slide Number Placeholder 5"/>
           <p:cNvSpPr>
             <a:spLocks noGrp="1"/>
           </p:cNvSpPr>
@@ -6198,7 +6147,7 @@
     </p:spTree>
     <p:extLst>
       <p:ext uri="{BB962C8B-B14F-4D97-AF65-F5344CB8AC3E}">
-        <p14:creationId xmlns:p14="http://schemas.microsoft.com/office/powerpoint/2010/main" val="3476979503"/>
+        <p14:creationId xmlns:p14="http://schemas.microsoft.com/office/powerpoint/2010/main" val="2506405964"/>
       </p:ext>
     </p:extLst>
   </p:cSld>
@@ -6227,13 +6176,7 @@
       </p:grpSpPr>
       <p:sp>
         <p:nvSpPr>
-          <p:cNvPr id="2" name="Vertical Title 1">
-            <a:extLst>
-              <a:ext uri="{FF2B5EF4-FFF2-40B4-BE49-F238E27FC236}">
-                <a16:creationId xmlns:a16="http://schemas.microsoft.com/office/drawing/2014/main" id="{1526DC98-4E47-385A-5E59-47FC4FAEF819}"/>
-              </a:ext>
-            </a:extLst>
-          </p:cNvPr>
+          <p:cNvPr id="2" name="Vertical Title 1"/>
           <p:cNvSpPr>
             <a:spLocks noGrp="1"/>
           </p:cNvSpPr>
@@ -6243,8 +6186,8 @@
         </p:nvSpPr>
         <p:spPr>
           <a:xfrm>
-            <a:off x="8724900" y="365125"/>
-            <a:ext cx="2628900" cy="5811838"/>
+            <a:off x="13087350" y="365125"/>
+            <a:ext cx="3943350" cy="5811838"/>
           </a:xfrm>
         </p:spPr>
         <p:txBody>
@@ -6255,18 +6198,13 @@
               <a:rPr lang="en-US"/>
               <a:t>Click to edit Master title style</a:t>
             </a:r>
+            <a:endParaRPr lang="en-US" dirty="0"/>
           </a:p>
         </p:txBody>
       </p:sp>
       <p:sp>
         <p:nvSpPr>
-          <p:cNvPr id="3" name="Vertical Text Placeholder 2">
-            <a:extLst>
-              <a:ext uri="{FF2B5EF4-FFF2-40B4-BE49-F238E27FC236}">
-                <a16:creationId xmlns:a16="http://schemas.microsoft.com/office/drawing/2014/main" id="{C78BCA85-383C-A7E1-4CDE-9137AE83BEBB}"/>
-              </a:ext>
-            </a:extLst>
-          </p:cNvPr>
+          <p:cNvPr id="3" name="Vertical Text Placeholder 2"/>
           <p:cNvSpPr>
             <a:spLocks noGrp="1"/>
           </p:cNvSpPr>
@@ -6276,8 +6214,8 @@
         </p:nvSpPr>
         <p:spPr>
           <a:xfrm>
-            <a:off x="838200" y="365125"/>
-            <a:ext cx="7734300" cy="5811838"/>
+            <a:off x="1257300" y="365125"/>
+            <a:ext cx="11601450" cy="5811838"/>
           </a:xfrm>
         </p:spPr>
         <p:txBody>
@@ -6317,18 +6255,13 @@
               <a:rPr lang="en-US"/>
               <a:t>Fifth level</a:t>
             </a:r>
+            <a:endParaRPr lang="en-US" dirty="0"/>
           </a:p>
         </p:txBody>
       </p:sp>
       <p:sp>
         <p:nvSpPr>
-          <p:cNvPr id="4" name="Date Placeholder 3">
-            <a:extLst>
-              <a:ext uri="{FF2B5EF4-FFF2-40B4-BE49-F238E27FC236}">
-                <a16:creationId xmlns:a16="http://schemas.microsoft.com/office/drawing/2014/main" id="{849BE70D-0A44-61B9-2E7B-4AF327DFE1D9}"/>
-              </a:ext>
-            </a:extLst>
-          </p:cNvPr>
+          <p:cNvPr id="4" name="Date Placeholder 3"/>
           <p:cNvSpPr>
             <a:spLocks noGrp="1"/>
           </p:cNvSpPr>
@@ -6343,7 +6276,7 @@
           <a:p>
             <a:fld id="{B6C7B70F-B9BD-40CD-A497-1FA080680CDD}" type="datetimeFigureOut">
               <a:rPr lang="en-US" smtClean="0"/>
-              <a:t>3/2/2023</a:t>
+              <a:t>3/22/2023</a:t>
             </a:fld>
             <a:endParaRPr lang="en-US"/>
           </a:p>
@@ -6351,13 +6284,7 @@
       </p:sp>
       <p:sp>
         <p:nvSpPr>
-          <p:cNvPr id="5" name="Footer Placeholder 4">
-            <a:extLst>
-              <a:ext uri="{FF2B5EF4-FFF2-40B4-BE49-F238E27FC236}">
-                <a16:creationId xmlns:a16="http://schemas.microsoft.com/office/drawing/2014/main" id="{84DE099C-7C1E-607F-328B-383AB7C67129}"/>
-              </a:ext>
-            </a:extLst>
-          </p:cNvPr>
+          <p:cNvPr id="5" name="Footer Placeholder 4"/>
           <p:cNvSpPr>
             <a:spLocks noGrp="1"/>
           </p:cNvSpPr>
@@ -6376,13 +6303,7 @@
       </p:sp>
       <p:sp>
         <p:nvSpPr>
-          <p:cNvPr id="6" name="Slide Number Placeholder 5">
-            <a:extLst>
-              <a:ext uri="{FF2B5EF4-FFF2-40B4-BE49-F238E27FC236}">
-                <a16:creationId xmlns:a16="http://schemas.microsoft.com/office/drawing/2014/main" id="{957FCF57-5F1F-B86F-15BB-3493618FECF1}"/>
-              </a:ext>
-            </a:extLst>
-          </p:cNvPr>
+          <p:cNvPr id="6" name="Slide Number Placeholder 5"/>
           <p:cNvSpPr>
             <a:spLocks noGrp="1"/>
           </p:cNvSpPr>
@@ -6406,7 +6327,7 @@
     </p:spTree>
     <p:extLst>
       <p:ext uri="{BB962C8B-B14F-4D97-AF65-F5344CB8AC3E}">
-        <p14:creationId xmlns:p14="http://schemas.microsoft.com/office/powerpoint/2010/main" val="3808939403"/>
+        <p14:creationId xmlns:p14="http://schemas.microsoft.com/office/powerpoint/2010/main" val="2170588264"/>
       </p:ext>
     </p:extLst>
   </p:cSld>
@@ -6435,13 +6356,7 @@
       </p:grpSpPr>
       <p:sp>
         <p:nvSpPr>
-          <p:cNvPr id="2" name="Title 1">
-            <a:extLst>
-              <a:ext uri="{FF2B5EF4-FFF2-40B4-BE49-F238E27FC236}">
-                <a16:creationId xmlns:a16="http://schemas.microsoft.com/office/drawing/2014/main" id="{660A8862-D353-8F8A-6A76-DBB73F9C7061}"/>
-              </a:ext>
-            </a:extLst>
-          </p:cNvPr>
+          <p:cNvPr id="2" name="Title 1"/>
           <p:cNvSpPr>
             <a:spLocks noGrp="1"/>
           </p:cNvSpPr>
@@ -6458,18 +6373,13 @@
               <a:rPr lang="en-US"/>
               <a:t>Click to edit Master title style</a:t>
             </a:r>
+            <a:endParaRPr lang="en-US" dirty="0"/>
           </a:p>
         </p:txBody>
       </p:sp>
       <p:sp>
         <p:nvSpPr>
-          <p:cNvPr id="3" name="Content Placeholder 2">
-            <a:extLst>
-              <a:ext uri="{FF2B5EF4-FFF2-40B4-BE49-F238E27FC236}">
-                <a16:creationId xmlns:a16="http://schemas.microsoft.com/office/drawing/2014/main" id="{BC54D1A3-186D-A823-2B2B-1E53C9AD3063}"/>
-              </a:ext>
-            </a:extLst>
-          </p:cNvPr>
+          <p:cNvPr id="3" name="Content Placeholder 2"/>
           <p:cNvSpPr>
             <a:spLocks noGrp="1"/>
           </p:cNvSpPr>
@@ -6515,18 +6425,13 @@
               <a:rPr lang="en-US"/>
               <a:t>Fifth level</a:t>
             </a:r>
+            <a:endParaRPr lang="en-US" dirty="0"/>
           </a:p>
         </p:txBody>
       </p:sp>
       <p:sp>
         <p:nvSpPr>
-          <p:cNvPr id="4" name="Date Placeholder 3">
-            <a:extLst>
-              <a:ext uri="{FF2B5EF4-FFF2-40B4-BE49-F238E27FC236}">
-                <a16:creationId xmlns:a16="http://schemas.microsoft.com/office/drawing/2014/main" id="{E3736782-32C9-AC02-EC9D-190FF82568CE}"/>
-              </a:ext>
-            </a:extLst>
-          </p:cNvPr>
+          <p:cNvPr id="4" name="Date Placeholder 3"/>
           <p:cNvSpPr>
             <a:spLocks noGrp="1"/>
           </p:cNvSpPr>
@@ -6541,7 +6446,7 @@
           <a:p>
             <a:fld id="{B6C7B70F-B9BD-40CD-A497-1FA080680CDD}" type="datetimeFigureOut">
               <a:rPr lang="en-US" smtClean="0"/>
-              <a:t>3/2/2023</a:t>
+              <a:t>3/22/2023</a:t>
             </a:fld>
             <a:endParaRPr lang="en-US"/>
           </a:p>
@@ -6549,13 +6454,7 @@
       </p:sp>
       <p:sp>
         <p:nvSpPr>
-          <p:cNvPr id="5" name="Footer Placeholder 4">
-            <a:extLst>
-              <a:ext uri="{FF2B5EF4-FFF2-40B4-BE49-F238E27FC236}">
-                <a16:creationId xmlns:a16="http://schemas.microsoft.com/office/drawing/2014/main" id="{4D532834-3387-784A-6018-E6E7F2C1C027}"/>
-              </a:ext>
-            </a:extLst>
-          </p:cNvPr>
+          <p:cNvPr id="5" name="Footer Placeholder 4"/>
           <p:cNvSpPr>
             <a:spLocks noGrp="1"/>
           </p:cNvSpPr>
@@ -6574,13 +6473,7 @@
       </p:sp>
       <p:sp>
         <p:nvSpPr>
-          <p:cNvPr id="6" name="Slide Number Placeholder 5">
-            <a:extLst>
-              <a:ext uri="{FF2B5EF4-FFF2-40B4-BE49-F238E27FC236}">
-                <a16:creationId xmlns:a16="http://schemas.microsoft.com/office/drawing/2014/main" id="{FDE6D8E0-1291-6373-764C-785717BC3FF4}"/>
-              </a:ext>
-            </a:extLst>
-          </p:cNvPr>
+          <p:cNvPr id="6" name="Slide Number Placeholder 5"/>
           <p:cNvSpPr>
             <a:spLocks noGrp="1"/>
           </p:cNvSpPr>
@@ -6604,7 +6497,7 @@
     </p:spTree>
     <p:extLst>
       <p:ext uri="{BB962C8B-B14F-4D97-AF65-F5344CB8AC3E}">
-        <p14:creationId xmlns:p14="http://schemas.microsoft.com/office/powerpoint/2010/main" val="3256909691"/>
+        <p14:creationId xmlns:p14="http://schemas.microsoft.com/office/powerpoint/2010/main" val="1775558198"/>
       </p:ext>
     </p:extLst>
   </p:cSld>
@@ -6633,13 +6526,7 @@
       </p:grpSpPr>
       <p:sp>
         <p:nvSpPr>
-          <p:cNvPr id="2" name="Title 1">
-            <a:extLst>
-              <a:ext uri="{FF2B5EF4-FFF2-40B4-BE49-F238E27FC236}">
-                <a16:creationId xmlns:a16="http://schemas.microsoft.com/office/drawing/2014/main" id="{A6B54DFF-24A4-BA78-4C90-EE216A48F6CF}"/>
-              </a:ext>
-            </a:extLst>
-          </p:cNvPr>
+          <p:cNvPr id="2" name="Title 1"/>
           <p:cNvSpPr>
             <a:spLocks noGrp="1"/>
           </p:cNvSpPr>
@@ -6649,8 +6536,8 @@
         </p:nvSpPr>
         <p:spPr>
           <a:xfrm>
-            <a:off x="831850" y="1709738"/>
-            <a:ext cx="10515600" cy="2852737"/>
+            <a:off x="1247775" y="1709739"/>
+            <a:ext cx="15773400" cy="2852737"/>
           </a:xfrm>
         </p:spPr>
         <p:txBody>
@@ -6665,18 +6552,13 @@
               <a:rPr lang="en-US"/>
               <a:t>Click to edit Master title style</a:t>
             </a:r>
+            <a:endParaRPr lang="en-US" dirty="0"/>
           </a:p>
         </p:txBody>
       </p:sp>
       <p:sp>
         <p:nvSpPr>
-          <p:cNvPr id="3" name="Text Placeholder 2">
-            <a:extLst>
-              <a:ext uri="{FF2B5EF4-FFF2-40B4-BE49-F238E27FC236}">
-                <a16:creationId xmlns:a16="http://schemas.microsoft.com/office/drawing/2014/main" id="{1865F86B-471D-265D-92E3-433B332B71CB}"/>
-              </a:ext>
-            </a:extLst>
-          </p:cNvPr>
+          <p:cNvPr id="3" name="Text Placeholder 2"/>
           <p:cNvSpPr>
             <a:spLocks noGrp="1"/>
           </p:cNvSpPr>
@@ -6686,8 +6568,8 @@
         </p:nvSpPr>
         <p:spPr>
           <a:xfrm>
-            <a:off x="831850" y="4589463"/>
-            <a:ext cx="10515600" cy="1500187"/>
+            <a:off x="1247775" y="4589464"/>
+            <a:ext cx="15773400" cy="1500187"/>
           </a:xfrm>
         </p:spPr>
         <p:txBody>
@@ -6795,13 +6677,7 @@
       </p:sp>
       <p:sp>
         <p:nvSpPr>
-          <p:cNvPr id="4" name="Date Placeholder 3">
-            <a:extLst>
-              <a:ext uri="{FF2B5EF4-FFF2-40B4-BE49-F238E27FC236}">
-                <a16:creationId xmlns:a16="http://schemas.microsoft.com/office/drawing/2014/main" id="{579DAC5A-1535-8F30-77A6-105F8727DFDC}"/>
-              </a:ext>
-            </a:extLst>
-          </p:cNvPr>
+          <p:cNvPr id="4" name="Date Placeholder 3"/>
           <p:cNvSpPr>
             <a:spLocks noGrp="1"/>
           </p:cNvSpPr>
@@ -6816,7 +6692,7 @@
           <a:p>
             <a:fld id="{B6C7B70F-B9BD-40CD-A497-1FA080680CDD}" type="datetimeFigureOut">
               <a:rPr lang="en-US" smtClean="0"/>
-              <a:t>3/2/2023</a:t>
+              <a:t>3/22/2023</a:t>
             </a:fld>
             <a:endParaRPr lang="en-US"/>
           </a:p>
@@ -6824,13 +6700,7 @@
       </p:sp>
       <p:sp>
         <p:nvSpPr>
-          <p:cNvPr id="5" name="Footer Placeholder 4">
-            <a:extLst>
-              <a:ext uri="{FF2B5EF4-FFF2-40B4-BE49-F238E27FC236}">
-                <a16:creationId xmlns:a16="http://schemas.microsoft.com/office/drawing/2014/main" id="{7A907A79-60DF-04C5-E450-1D64A4D27CD8}"/>
-              </a:ext>
-            </a:extLst>
-          </p:cNvPr>
+          <p:cNvPr id="5" name="Footer Placeholder 4"/>
           <p:cNvSpPr>
             <a:spLocks noGrp="1"/>
           </p:cNvSpPr>
@@ -6849,13 +6719,7 @@
       </p:sp>
       <p:sp>
         <p:nvSpPr>
-          <p:cNvPr id="6" name="Slide Number Placeholder 5">
-            <a:extLst>
-              <a:ext uri="{FF2B5EF4-FFF2-40B4-BE49-F238E27FC236}">
-                <a16:creationId xmlns:a16="http://schemas.microsoft.com/office/drawing/2014/main" id="{6DF885F2-FA0A-685A-25CB-01412D2F660E}"/>
-              </a:ext>
-            </a:extLst>
-          </p:cNvPr>
+          <p:cNvPr id="6" name="Slide Number Placeholder 5"/>
           <p:cNvSpPr>
             <a:spLocks noGrp="1"/>
           </p:cNvSpPr>
@@ -6879,7 +6743,7 @@
     </p:spTree>
     <p:extLst>
       <p:ext uri="{BB962C8B-B14F-4D97-AF65-F5344CB8AC3E}">
-        <p14:creationId xmlns:p14="http://schemas.microsoft.com/office/powerpoint/2010/main" val="432758100"/>
+        <p14:creationId xmlns:p14="http://schemas.microsoft.com/office/powerpoint/2010/main" val="1215315953"/>
       </p:ext>
     </p:extLst>
   </p:cSld>
@@ -6908,13 +6772,7 @@
       </p:grpSpPr>
       <p:sp>
         <p:nvSpPr>
-          <p:cNvPr id="2" name="Title 1">
-            <a:extLst>
-              <a:ext uri="{FF2B5EF4-FFF2-40B4-BE49-F238E27FC236}">
-                <a16:creationId xmlns:a16="http://schemas.microsoft.com/office/drawing/2014/main" id="{3011621B-2E23-E9D8-126F-03E40110631C}"/>
-              </a:ext>
-            </a:extLst>
-          </p:cNvPr>
+          <p:cNvPr id="2" name="Title 1"/>
           <p:cNvSpPr>
             <a:spLocks noGrp="1"/>
           </p:cNvSpPr>
@@ -6931,18 +6789,13 @@
               <a:rPr lang="en-US"/>
               <a:t>Click to edit Master title style</a:t>
             </a:r>
+            <a:endParaRPr lang="en-US" dirty="0"/>
           </a:p>
         </p:txBody>
       </p:sp>
       <p:sp>
         <p:nvSpPr>
-          <p:cNvPr id="3" name="Content Placeholder 2">
-            <a:extLst>
-              <a:ext uri="{FF2B5EF4-FFF2-40B4-BE49-F238E27FC236}">
-                <a16:creationId xmlns:a16="http://schemas.microsoft.com/office/drawing/2014/main" id="{82D6CE5E-7EFD-1273-14A5-69E62242E962}"/>
-              </a:ext>
-            </a:extLst>
-          </p:cNvPr>
+          <p:cNvPr id="3" name="Content Placeholder 2"/>
           <p:cNvSpPr>
             <a:spLocks noGrp="1"/>
           </p:cNvSpPr>
@@ -6952,8 +6805,8 @@
         </p:nvSpPr>
         <p:spPr>
           <a:xfrm>
-            <a:off x="838200" y="1825625"/>
-            <a:ext cx="5181600" cy="4351338"/>
+            <a:off x="1257300" y="1825625"/>
+            <a:ext cx="7772400" cy="4351338"/>
           </a:xfrm>
         </p:spPr>
         <p:txBody>
@@ -6993,18 +6846,13 @@
               <a:rPr lang="en-US"/>
               <a:t>Fifth level</a:t>
             </a:r>
+            <a:endParaRPr lang="en-US" dirty="0"/>
           </a:p>
         </p:txBody>
       </p:sp>
       <p:sp>
         <p:nvSpPr>
-          <p:cNvPr id="4" name="Content Placeholder 3">
-            <a:extLst>
-              <a:ext uri="{FF2B5EF4-FFF2-40B4-BE49-F238E27FC236}">
-                <a16:creationId xmlns:a16="http://schemas.microsoft.com/office/drawing/2014/main" id="{19C3F671-4A94-A773-8E15-28377E80FBDC}"/>
-              </a:ext>
-            </a:extLst>
-          </p:cNvPr>
+          <p:cNvPr id="4" name="Content Placeholder 3"/>
           <p:cNvSpPr>
             <a:spLocks noGrp="1"/>
           </p:cNvSpPr>
@@ -7014,8 +6862,8 @@
         </p:nvSpPr>
         <p:spPr>
           <a:xfrm>
-            <a:off x="6172200" y="1825625"/>
-            <a:ext cx="5181600" cy="4351338"/>
+            <a:off x="9258300" y="1825625"/>
+            <a:ext cx="7772400" cy="4351338"/>
           </a:xfrm>
         </p:spPr>
         <p:txBody>
@@ -7055,18 +6903,13 @@
               <a:rPr lang="en-US"/>
               <a:t>Fifth level</a:t>
             </a:r>
+            <a:endParaRPr lang="en-US" dirty="0"/>
           </a:p>
         </p:txBody>
       </p:sp>
       <p:sp>
         <p:nvSpPr>
-          <p:cNvPr id="5" name="Date Placeholder 4">
-            <a:extLst>
-              <a:ext uri="{FF2B5EF4-FFF2-40B4-BE49-F238E27FC236}">
-                <a16:creationId xmlns:a16="http://schemas.microsoft.com/office/drawing/2014/main" id="{4926DD20-BD27-B8F5-41A6-94BBA5F1A019}"/>
-              </a:ext>
-            </a:extLst>
-          </p:cNvPr>
+          <p:cNvPr id="5" name="Date Placeholder 4"/>
           <p:cNvSpPr>
             <a:spLocks noGrp="1"/>
           </p:cNvSpPr>
@@ -7081,7 +6924,7 @@
           <a:p>
             <a:fld id="{B6C7B70F-B9BD-40CD-A497-1FA080680CDD}" type="datetimeFigureOut">
               <a:rPr lang="en-US" smtClean="0"/>
-              <a:t>3/2/2023</a:t>
+              <a:t>3/22/2023</a:t>
             </a:fld>
             <a:endParaRPr lang="en-US"/>
           </a:p>
@@ -7089,13 +6932,7 @@
       </p:sp>
       <p:sp>
         <p:nvSpPr>
-          <p:cNvPr id="6" name="Footer Placeholder 5">
-            <a:extLst>
-              <a:ext uri="{FF2B5EF4-FFF2-40B4-BE49-F238E27FC236}">
-                <a16:creationId xmlns:a16="http://schemas.microsoft.com/office/drawing/2014/main" id="{1BAEDF2B-C51C-73EF-529B-CA01CB703698}"/>
-              </a:ext>
-            </a:extLst>
-          </p:cNvPr>
+          <p:cNvPr id="6" name="Footer Placeholder 5"/>
           <p:cNvSpPr>
             <a:spLocks noGrp="1"/>
           </p:cNvSpPr>
@@ -7114,13 +6951,7 @@
       </p:sp>
       <p:sp>
         <p:nvSpPr>
-          <p:cNvPr id="7" name="Slide Number Placeholder 6">
-            <a:extLst>
-              <a:ext uri="{FF2B5EF4-FFF2-40B4-BE49-F238E27FC236}">
-                <a16:creationId xmlns:a16="http://schemas.microsoft.com/office/drawing/2014/main" id="{D65404DD-6F64-1A04-C375-A5446880584F}"/>
-              </a:ext>
-            </a:extLst>
-          </p:cNvPr>
+          <p:cNvPr id="7" name="Slide Number Placeholder 6"/>
           <p:cNvSpPr>
             <a:spLocks noGrp="1"/>
           </p:cNvSpPr>
@@ -7144,7 +6975,7 @@
     </p:spTree>
     <p:extLst>
       <p:ext uri="{BB962C8B-B14F-4D97-AF65-F5344CB8AC3E}">
-        <p14:creationId xmlns:p14="http://schemas.microsoft.com/office/powerpoint/2010/main" val="3309001248"/>
+        <p14:creationId xmlns:p14="http://schemas.microsoft.com/office/powerpoint/2010/main" val="2029286089"/>
       </p:ext>
     </p:extLst>
   </p:cSld>
@@ -7173,13 +7004,7 @@
       </p:grpSpPr>
       <p:sp>
         <p:nvSpPr>
-          <p:cNvPr id="2" name="Title 1">
-            <a:extLst>
-              <a:ext uri="{FF2B5EF4-FFF2-40B4-BE49-F238E27FC236}">
-                <a16:creationId xmlns:a16="http://schemas.microsoft.com/office/drawing/2014/main" id="{662A04BC-5AD3-653F-EB29-DCACEFBBE384}"/>
-              </a:ext>
-            </a:extLst>
-          </p:cNvPr>
+          <p:cNvPr id="2" name="Title 1"/>
           <p:cNvSpPr>
             <a:spLocks noGrp="1"/>
           </p:cNvSpPr>
@@ -7189,8 +7014,8 @@
         </p:nvSpPr>
         <p:spPr>
           <a:xfrm>
-            <a:off x="839788" y="365125"/>
-            <a:ext cx="10515600" cy="1325563"/>
+            <a:off x="1259682" y="365126"/>
+            <a:ext cx="15773400" cy="1325563"/>
           </a:xfrm>
         </p:spPr>
         <p:txBody>
@@ -7201,18 +7026,13 @@
               <a:rPr lang="en-US"/>
               <a:t>Click to edit Master title style</a:t>
             </a:r>
+            <a:endParaRPr lang="en-US" dirty="0"/>
           </a:p>
         </p:txBody>
       </p:sp>
       <p:sp>
         <p:nvSpPr>
-          <p:cNvPr id="3" name="Text Placeholder 2">
-            <a:extLst>
-              <a:ext uri="{FF2B5EF4-FFF2-40B4-BE49-F238E27FC236}">
-                <a16:creationId xmlns:a16="http://schemas.microsoft.com/office/drawing/2014/main" id="{3C56AD23-4B5D-0B1F-EA5B-01EF76CFBD47}"/>
-              </a:ext>
-            </a:extLst>
-          </p:cNvPr>
+          <p:cNvPr id="3" name="Text Placeholder 2"/>
           <p:cNvSpPr>
             <a:spLocks noGrp="1"/>
           </p:cNvSpPr>
@@ -7222,8 +7042,8 @@
         </p:nvSpPr>
         <p:spPr>
           <a:xfrm>
-            <a:off x="839788" y="1681163"/>
-            <a:ext cx="5157787" cy="823912"/>
+            <a:off x="1259683" y="1681163"/>
+            <a:ext cx="7736681" cy="823912"/>
           </a:xfrm>
         </p:spPr>
         <p:txBody>
@@ -7277,13 +7097,7 @@
       </p:sp>
       <p:sp>
         <p:nvSpPr>
-          <p:cNvPr id="4" name="Content Placeholder 3">
-            <a:extLst>
-              <a:ext uri="{FF2B5EF4-FFF2-40B4-BE49-F238E27FC236}">
-                <a16:creationId xmlns:a16="http://schemas.microsoft.com/office/drawing/2014/main" id="{D076C626-6769-A19A-DA75-42409634F962}"/>
-              </a:ext>
-            </a:extLst>
-          </p:cNvPr>
+          <p:cNvPr id="4" name="Content Placeholder 3"/>
           <p:cNvSpPr>
             <a:spLocks noGrp="1"/>
           </p:cNvSpPr>
@@ -7293,8 +7107,8 @@
         </p:nvSpPr>
         <p:spPr>
           <a:xfrm>
-            <a:off x="839788" y="2505075"/>
-            <a:ext cx="5157787" cy="3684588"/>
+            <a:off x="1259683" y="2505075"/>
+            <a:ext cx="7736681" cy="3684588"/>
           </a:xfrm>
         </p:spPr>
         <p:txBody>
@@ -7334,18 +7148,13 @@
               <a:rPr lang="en-US"/>
               <a:t>Fifth level</a:t>
             </a:r>
+            <a:endParaRPr lang="en-US" dirty="0"/>
           </a:p>
         </p:txBody>
       </p:sp>
       <p:sp>
         <p:nvSpPr>
-          <p:cNvPr id="5" name="Text Placeholder 4">
-            <a:extLst>
-              <a:ext uri="{FF2B5EF4-FFF2-40B4-BE49-F238E27FC236}">
-                <a16:creationId xmlns:a16="http://schemas.microsoft.com/office/drawing/2014/main" id="{3457F9ED-0DA6-C81E-DBAA-0BE74D008844}"/>
-              </a:ext>
-            </a:extLst>
-          </p:cNvPr>
+          <p:cNvPr id="5" name="Text Placeholder 4"/>
           <p:cNvSpPr>
             <a:spLocks noGrp="1"/>
           </p:cNvSpPr>
@@ -7355,8 +7164,8 @@
         </p:nvSpPr>
         <p:spPr>
           <a:xfrm>
-            <a:off x="6172200" y="1681163"/>
-            <a:ext cx="5183188" cy="823912"/>
+            <a:off x="9258300" y="1681163"/>
+            <a:ext cx="7774782" cy="823912"/>
           </a:xfrm>
         </p:spPr>
         <p:txBody>
@@ -7410,13 +7219,7 @@
       </p:sp>
       <p:sp>
         <p:nvSpPr>
-          <p:cNvPr id="6" name="Content Placeholder 5">
-            <a:extLst>
-              <a:ext uri="{FF2B5EF4-FFF2-40B4-BE49-F238E27FC236}">
-                <a16:creationId xmlns:a16="http://schemas.microsoft.com/office/drawing/2014/main" id="{4816ED35-498D-6BEB-DBD6-51D4649F6A00}"/>
-              </a:ext>
-            </a:extLst>
-          </p:cNvPr>
+          <p:cNvPr id="6" name="Content Placeholder 5"/>
           <p:cNvSpPr>
             <a:spLocks noGrp="1"/>
           </p:cNvSpPr>
@@ -7426,8 +7229,8 @@
         </p:nvSpPr>
         <p:spPr>
           <a:xfrm>
-            <a:off x="6172200" y="2505075"/>
-            <a:ext cx="5183188" cy="3684588"/>
+            <a:off x="9258300" y="2505075"/>
+            <a:ext cx="7774782" cy="3684588"/>
           </a:xfrm>
         </p:spPr>
         <p:txBody>
@@ -7467,18 +7270,13 @@
               <a:rPr lang="en-US"/>
               <a:t>Fifth level</a:t>
             </a:r>
+            <a:endParaRPr lang="en-US" dirty="0"/>
           </a:p>
         </p:txBody>
       </p:sp>
       <p:sp>
         <p:nvSpPr>
-          <p:cNvPr id="7" name="Date Placeholder 6">
-            <a:extLst>
-              <a:ext uri="{FF2B5EF4-FFF2-40B4-BE49-F238E27FC236}">
-                <a16:creationId xmlns:a16="http://schemas.microsoft.com/office/drawing/2014/main" id="{0DE999AA-3D29-3970-9906-D18C6CDAC1CC}"/>
-              </a:ext>
-            </a:extLst>
-          </p:cNvPr>
+          <p:cNvPr id="7" name="Date Placeholder 6"/>
           <p:cNvSpPr>
             <a:spLocks noGrp="1"/>
           </p:cNvSpPr>
@@ -7493,7 +7291,7 @@
           <a:p>
             <a:fld id="{B6C7B70F-B9BD-40CD-A497-1FA080680CDD}" type="datetimeFigureOut">
               <a:rPr lang="en-US" smtClean="0"/>
-              <a:t>3/2/2023</a:t>
+              <a:t>3/22/2023</a:t>
             </a:fld>
             <a:endParaRPr lang="en-US"/>
           </a:p>
@@ -7501,13 +7299,7 @@
       </p:sp>
       <p:sp>
         <p:nvSpPr>
-          <p:cNvPr id="8" name="Footer Placeholder 7">
-            <a:extLst>
-              <a:ext uri="{FF2B5EF4-FFF2-40B4-BE49-F238E27FC236}">
-                <a16:creationId xmlns:a16="http://schemas.microsoft.com/office/drawing/2014/main" id="{7A70A036-3232-C6D4-4DFE-E2C452919D5F}"/>
-              </a:ext>
-            </a:extLst>
-          </p:cNvPr>
+          <p:cNvPr id="8" name="Footer Placeholder 7"/>
           <p:cNvSpPr>
             <a:spLocks noGrp="1"/>
           </p:cNvSpPr>
@@ -7526,13 +7318,7 @@
       </p:sp>
       <p:sp>
         <p:nvSpPr>
-          <p:cNvPr id="9" name="Slide Number Placeholder 8">
-            <a:extLst>
-              <a:ext uri="{FF2B5EF4-FFF2-40B4-BE49-F238E27FC236}">
-                <a16:creationId xmlns:a16="http://schemas.microsoft.com/office/drawing/2014/main" id="{4FD198CC-7119-BF2F-6FD0-482324E2B509}"/>
-              </a:ext>
-            </a:extLst>
-          </p:cNvPr>
+          <p:cNvPr id="9" name="Slide Number Placeholder 8"/>
           <p:cNvSpPr>
             <a:spLocks noGrp="1"/>
           </p:cNvSpPr>
@@ -7556,7 +7342,7 @@
     </p:spTree>
     <p:extLst>
       <p:ext uri="{BB962C8B-B14F-4D97-AF65-F5344CB8AC3E}">
-        <p14:creationId xmlns:p14="http://schemas.microsoft.com/office/powerpoint/2010/main" val="1607269923"/>
+        <p14:creationId xmlns:p14="http://schemas.microsoft.com/office/powerpoint/2010/main" val="1952644020"/>
       </p:ext>
     </p:extLst>
   </p:cSld>
@@ -7585,13 +7371,7 @@
       </p:grpSpPr>
       <p:sp>
         <p:nvSpPr>
-          <p:cNvPr id="2" name="Title 1">
-            <a:extLst>
-              <a:ext uri="{FF2B5EF4-FFF2-40B4-BE49-F238E27FC236}">
-                <a16:creationId xmlns:a16="http://schemas.microsoft.com/office/drawing/2014/main" id="{97ACD3F5-BDD0-7F9D-7ACA-C8D3C521632B}"/>
-              </a:ext>
-            </a:extLst>
-          </p:cNvPr>
+          <p:cNvPr id="2" name="Title 1"/>
           <p:cNvSpPr>
             <a:spLocks noGrp="1"/>
           </p:cNvSpPr>
@@ -7608,18 +7388,13 @@
               <a:rPr lang="en-US"/>
               <a:t>Click to edit Master title style</a:t>
             </a:r>
+            <a:endParaRPr lang="en-US" dirty="0"/>
           </a:p>
         </p:txBody>
       </p:sp>
       <p:sp>
         <p:nvSpPr>
-          <p:cNvPr id="3" name="Date Placeholder 2">
-            <a:extLst>
-              <a:ext uri="{FF2B5EF4-FFF2-40B4-BE49-F238E27FC236}">
-                <a16:creationId xmlns:a16="http://schemas.microsoft.com/office/drawing/2014/main" id="{9B3CA6E1-AED2-D346-4359-6E1BA7AEFD7C}"/>
-              </a:ext>
-            </a:extLst>
-          </p:cNvPr>
+          <p:cNvPr id="3" name="Date Placeholder 2"/>
           <p:cNvSpPr>
             <a:spLocks noGrp="1"/>
           </p:cNvSpPr>
@@ -7634,7 +7409,7 @@
           <a:p>
             <a:fld id="{B6C7B70F-B9BD-40CD-A497-1FA080680CDD}" type="datetimeFigureOut">
               <a:rPr lang="en-US" smtClean="0"/>
-              <a:t>3/2/2023</a:t>
+              <a:t>3/22/2023</a:t>
             </a:fld>
             <a:endParaRPr lang="en-US"/>
           </a:p>
@@ -7642,13 +7417,7 @@
       </p:sp>
       <p:sp>
         <p:nvSpPr>
-          <p:cNvPr id="4" name="Footer Placeholder 3">
-            <a:extLst>
-              <a:ext uri="{FF2B5EF4-FFF2-40B4-BE49-F238E27FC236}">
-                <a16:creationId xmlns:a16="http://schemas.microsoft.com/office/drawing/2014/main" id="{1DF94952-20CB-60D6-81C1-FB9A4B742176}"/>
-              </a:ext>
-            </a:extLst>
-          </p:cNvPr>
+          <p:cNvPr id="4" name="Footer Placeholder 3"/>
           <p:cNvSpPr>
             <a:spLocks noGrp="1"/>
           </p:cNvSpPr>
@@ -7667,13 +7436,7 @@
       </p:sp>
       <p:sp>
         <p:nvSpPr>
-          <p:cNvPr id="5" name="Slide Number Placeholder 4">
-            <a:extLst>
-              <a:ext uri="{FF2B5EF4-FFF2-40B4-BE49-F238E27FC236}">
-                <a16:creationId xmlns:a16="http://schemas.microsoft.com/office/drawing/2014/main" id="{4AA4D9F2-B710-0714-7DD1-3D7FE12E351A}"/>
-              </a:ext>
-            </a:extLst>
-          </p:cNvPr>
+          <p:cNvPr id="5" name="Slide Number Placeholder 4"/>
           <p:cNvSpPr>
             <a:spLocks noGrp="1"/>
           </p:cNvSpPr>
@@ -7697,7 +7460,7 @@
     </p:spTree>
     <p:extLst>
       <p:ext uri="{BB962C8B-B14F-4D97-AF65-F5344CB8AC3E}">
-        <p14:creationId xmlns:p14="http://schemas.microsoft.com/office/powerpoint/2010/main" val="2315777603"/>
+        <p14:creationId xmlns:p14="http://schemas.microsoft.com/office/powerpoint/2010/main" val="2605704336"/>
       </p:ext>
     </p:extLst>
   </p:cSld>
@@ -7726,13 +7489,7 @@
       </p:grpSpPr>
       <p:sp>
         <p:nvSpPr>
-          <p:cNvPr id="2" name="Date Placeholder 1">
-            <a:extLst>
-              <a:ext uri="{FF2B5EF4-FFF2-40B4-BE49-F238E27FC236}">
-                <a16:creationId xmlns:a16="http://schemas.microsoft.com/office/drawing/2014/main" id="{CBD8E31D-6129-1A28-6A77-06E0393B8FD1}"/>
-              </a:ext>
-            </a:extLst>
-          </p:cNvPr>
+          <p:cNvPr id="2" name="Date Placeholder 1"/>
           <p:cNvSpPr>
             <a:spLocks noGrp="1"/>
           </p:cNvSpPr>
@@ -7747,7 +7504,7 @@
           <a:p>
             <a:fld id="{B6C7B70F-B9BD-40CD-A497-1FA080680CDD}" type="datetimeFigureOut">
               <a:rPr lang="en-US" smtClean="0"/>
-              <a:t>3/2/2023</a:t>
+              <a:t>3/22/2023</a:t>
             </a:fld>
             <a:endParaRPr lang="en-US"/>
           </a:p>
@@ -7755,13 +7512,7 @@
       </p:sp>
       <p:sp>
         <p:nvSpPr>
-          <p:cNvPr id="3" name="Footer Placeholder 2">
-            <a:extLst>
-              <a:ext uri="{FF2B5EF4-FFF2-40B4-BE49-F238E27FC236}">
-                <a16:creationId xmlns:a16="http://schemas.microsoft.com/office/drawing/2014/main" id="{FA64D111-E2DD-B374-ACFC-1E368335C929}"/>
-              </a:ext>
-            </a:extLst>
-          </p:cNvPr>
+          <p:cNvPr id="3" name="Footer Placeholder 2"/>
           <p:cNvSpPr>
             <a:spLocks noGrp="1"/>
           </p:cNvSpPr>
@@ -7780,13 +7531,7 @@
       </p:sp>
       <p:sp>
         <p:nvSpPr>
-          <p:cNvPr id="4" name="Slide Number Placeholder 3">
-            <a:extLst>
-              <a:ext uri="{FF2B5EF4-FFF2-40B4-BE49-F238E27FC236}">
-                <a16:creationId xmlns:a16="http://schemas.microsoft.com/office/drawing/2014/main" id="{99174BC2-0426-FC85-74FF-5B99B106449E}"/>
-              </a:ext>
-            </a:extLst>
-          </p:cNvPr>
+          <p:cNvPr id="4" name="Slide Number Placeholder 3"/>
           <p:cNvSpPr>
             <a:spLocks noGrp="1"/>
           </p:cNvSpPr>
@@ -7810,7 +7555,7 @@
     </p:spTree>
     <p:extLst>
       <p:ext uri="{BB962C8B-B14F-4D97-AF65-F5344CB8AC3E}">
-        <p14:creationId xmlns:p14="http://schemas.microsoft.com/office/powerpoint/2010/main" val="4087493301"/>
+        <p14:creationId xmlns:p14="http://schemas.microsoft.com/office/powerpoint/2010/main" val="4000095623"/>
       </p:ext>
     </p:extLst>
   </p:cSld>
@@ -7839,13 +7584,7 @@
       </p:grpSpPr>
       <p:sp>
         <p:nvSpPr>
-          <p:cNvPr id="2" name="Title 1">
-            <a:extLst>
-              <a:ext uri="{FF2B5EF4-FFF2-40B4-BE49-F238E27FC236}">
-                <a16:creationId xmlns:a16="http://schemas.microsoft.com/office/drawing/2014/main" id="{D8060BF3-53D2-6AA0-24D4-C92E612A4423}"/>
-              </a:ext>
-            </a:extLst>
-          </p:cNvPr>
+          <p:cNvPr id="2" name="Title 1"/>
           <p:cNvSpPr>
             <a:spLocks noGrp="1"/>
           </p:cNvSpPr>
@@ -7855,8 +7594,8 @@
         </p:nvSpPr>
         <p:spPr>
           <a:xfrm>
-            <a:off x="839788" y="457200"/>
-            <a:ext cx="3932237" cy="1600200"/>
+            <a:off x="1259683" y="457200"/>
+            <a:ext cx="5898356" cy="1600200"/>
           </a:xfrm>
         </p:spPr>
         <p:txBody>
@@ -7871,18 +7610,13 @@
               <a:rPr lang="en-US"/>
               <a:t>Click to edit Master title style</a:t>
             </a:r>
+            <a:endParaRPr lang="en-US" dirty="0"/>
           </a:p>
         </p:txBody>
       </p:sp>
       <p:sp>
         <p:nvSpPr>
-          <p:cNvPr id="3" name="Content Placeholder 2">
-            <a:extLst>
-              <a:ext uri="{FF2B5EF4-FFF2-40B4-BE49-F238E27FC236}">
-                <a16:creationId xmlns:a16="http://schemas.microsoft.com/office/drawing/2014/main" id="{CE9FDEB7-6A38-B705-286B-BCE1C7976B11}"/>
-              </a:ext>
-            </a:extLst>
-          </p:cNvPr>
+          <p:cNvPr id="3" name="Content Placeholder 2"/>
           <p:cNvSpPr>
             <a:spLocks noGrp="1"/>
           </p:cNvSpPr>
@@ -7892,8 +7626,8 @@
         </p:nvSpPr>
         <p:spPr>
           <a:xfrm>
-            <a:off x="5183188" y="987425"/>
-            <a:ext cx="6172200" cy="4873625"/>
+            <a:off x="7774782" y="987426"/>
+            <a:ext cx="9258300" cy="4873625"/>
           </a:xfrm>
         </p:spPr>
         <p:txBody>
@@ -7961,18 +7695,13 @@
               <a:rPr lang="en-US"/>
               <a:t>Fifth level</a:t>
             </a:r>
+            <a:endParaRPr lang="en-US" dirty="0"/>
           </a:p>
         </p:txBody>
       </p:sp>
       <p:sp>
         <p:nvSpPr>
-          <p:cNvPr id="4" name="Text Placeholder 3">
-            <a:extLst>
-              <a:ext uri="{FF2B5EF4-FFF2-40B4-BE49-F238E27FC236}">
-                <a16:creationId xmlns:a16="http://schemas.microsoft.com/office/drawing/2014/main" id="{2668B266-7A8C-7626-5DC0-B70E0EB642A2}"/>
-              </a:ext>
-            </a:extLst>
-          </p:cNvPr>
+          <p:cNvPr id="4" name="Text Placeholder 3"/>
           <p:cNvSpPr>
             <a:spLocks noGrp="1"/>
           </p:cNvSpPr>
@@ -7982,8 +7711,8 @@
         </p:nvSpPr>
         <p:spPr>
           <a:xfrm>
-            <a:off x="839788" y="2057400"/>
-            <a:ext cx="3932237" cy="3811588"/>
+            <a:off x="1259683" y="2057400"/>
+            <a:ext cx="5898356" cy="3811588"/>
           </a:xfrm>
         </p:spPr>
         <p:txBody>
@@ -8037,13 +7766,7 @@
       </p:sp>
       <p:sp>
         <p:nvSpPr>
-          <p:cNvPr id="5" name="Date Placeholder 4">
-            <a:extLst>
-              <a:ext uri="{FF2B5EF4-FFF2-40B4-BE49-F238E27FC236}">
-                <a16:creationId xmlns:a16="http://schemas.microsoft.com/office/drawing/2014/main" id="{F66D46F9-F5ED-5C5C-9027-C0E403261B1C}"/>
-              </a:ext>
-            </a:extLst>
-          </p:cNvPr>
+          <p:cNvPr id="5" name="Date Placeholder 4"/>
           <p:cNvSpPr>
             <a:spLocks noGrp="1"/>
           </p:cNvSpPr>
@@ -8058,7 +7781,7 @@
           <a:p>
             <a:fld id="{B6C7B70F-B9BD-40CD-A497-1FA080680CDD}" type="datetimeFigureOut">
               <a:rPr lang="en-US" smtClean="0"/>
-              <a:t>3/2/2023</a:t>
+              <a:t>3/22/2023</a:t>
             </a:fld>
             <a:endParaRPr lang="en-US"/>
           </a:p>
@@ -8066,13 +7789,7 @@
       </p:sp>
       <p:sp>
         <p:nvSpPr>
-          <p:cNvPr id="6" name="Footer Placeholder 5">
-            <a:extLst>
-              <a:ext uri="{FF2B5EF4-FFF2-40B4-BE49-F238E27FC236}">
-                <a16:creationId xmlns:a16="http://schemas.microsoft.com/office/drawing/2014/main" id="{E8AAE188-2FBC-3741-02F7-CFA099CE8C4A}"/>
-              </a:ext>
-            </a:extLst>
-          </p:cNvPr>
+          <p:cNvPr id="6" name="Footer Placeholder 5"/>
           <p:cNvSpPr>
             <a:spLocks noGrp="1"/>
           </p:cNvSpPr>
@@ -8091,13 +7808,7 @@
       </p:sp>
       <p:sp>
         <p:nvSpPr>
-          <p:cNvPr id="7" name="Slide Number Placeholder 6">
-            <a:extLst>
-              <a:ext uri="{FF2B5EF4-FFF2-40B4-BE49-F238E27FC236}">
-                <a16:creationId xmlns:a16="http://schemas.microsoft.com/office/drawing/2014/main" id="{DF7630DF-9BBF-F79D-DA6E-542964B0FFAD}"/>
-              </a:ext>
-            </a:extLst>
-          </p:cNvPr>
+          <p:cNvPr id="7" name="Slide Number Placeholder 6"/>
           <p:cNvSpPr>
             <a:spLocks noGrp="1"/>
           </p:cNvSpPr>
@@ -8121,7 +7832,7 @@
     </p:spTree>
     <p:extLst>
       <p:ext uri="{BB962C8B-B14F-4D97-AF65-F5344CB8AC3E}">
-        <p14:creationId xmlns:p14="http://schemas.microsoft.com/office/powerpoint/2010/main" val="2720163594"/>
+        <p14:creationId xmlns:p14="http://schemas.microsoft.com/office/powerpoint/2010/main" val="2480124460"/>
       </p:ext>
     </p:extLst>
   </p:cSld>
@@ -8150,13 +7861,7 @@
       </p:grpSpPr>
       <p:sp>
         <p:nvSpPr>
-          <p:cNvPr id="2" name="Title 1">
-            <a:extLst>
-              <a:ext uri="{FF2B5EF4-FFF2-40B4-BE49-F238E27FC236}">
-                <a16:creationId xmlns:a16="http://schemas.microsoft.com/office/drawing/2014/main" id="{7321FB68-E991-7038-B85F-940A2B156B62}"/>
-              </a:ext>
-            </a:extLst>
-          </p:cNvPr>
+          <p:cNvPr id="2" name="Title 1"/>
           <p:cNvSpPr>
             <a:spLocks noGrp="1"/>
           </p:cNvSpPr>
@@ -8166,8 +7871,8 @@
         </p:nvSpPr>
         <p:spPr>
           <a:xfrm>
-            <a:off x="839788" y="457200"/>
-            <a:ext cx="3932237" cy="1600200"/>
+            <a:off x="1259683" y="457200"/>
+            <a:ext cx="5898356" cy="1600200"/>
           </a:xfrm>
         </p:spPr>
         <p:txBody>
@@ -8182,20 +7887,15 @@
               <a:rPr lang="en-US"/>
               <a:t>Click to edit Master title style</a:t>
             </a:r>
+            <a:endParaRPr lang="en-US" dirty="0"/>
           </a:p>
         </p:txBody>
       </p:sp>
       <p:sp>
         <p:nvSpPr>
-          <p:cNvPr id="3" name="Picture Placeholder 2">
-            <a:extLst>
-              <a:ext uri="{FF2B5EF4-FFF2-40B4-BE49-F238E27FC236}">
-                <a16:creationId xmlns:a16="http://schemas.microsoft.com/office/drawing/2014/main" id="{9E014D3F-282D-196B-A505-225BABEACFE2}"/>
-              </a:ext>
-            </a:extLst>
-          </p:cNvPr>
+          <p:cNvPr id="3" name="Picture Placeholder 2"/>
           <p:cNvSpPr>
-            <a:spLocks noGrp="1"/>
+            <a:spLocks noGrp="1" noChangeAspect="1"/>
           </p:cNvSpPr>
           <p:nvPr>
             <p:ph type="pic" idx="1"/>
@@ -8203,12 +7903,12 @@
         </p:nvSpPr>
         <p:spPr>
           <a:xfrm>
-            <a:off x="5183188" y="987425"/>
-            <a:ext cx="6172200" cy="4873625"/>
+            <a:off x="7774782" y="987426"/>
+            <a:ext cx="9258300" cy="4873625"/>
           </a:xfrm>
         </p:spPr>
         <p:txBody>
-          <a:bodyPr/>
+          <a:bodyPr anchor="t"/>
           <a:lstStyle>
             <a:lvl1pPr marL="0" indent="0">
               <a:buNone/>
@@ -8248,19 +7948,17 @@
             </a:lvl9pPr>
           </a:lstStyle>
           <a:p>
-            <a:endParaRPr lang="en-US"/>
+            <a:r>
+              <a:rPr lang="en-US"/>
+              <a:t>Click icon to add picture</a:t>
+            </a:r>
+            <a:endParaRPr lang="en-US" dirty="0"/>
           </a:p>
         </p:txBody>
       </p:sp>
       <p:sp>
         <p:nvSpPr>
-          <p:cNvPr id="4" name="Text Placeholder 3">
-            <a:extLst>
-              <a:ext uri="{FF2B5EF4-FFF2-40B4-BE49-F238E27FC236}">
-                <a16:creationId xmlns:a16="http://schemas.microsoft.com/office/drawing/2014/main" id="{E4917867-4C9F-BE5E-D5FC-0D458FFF8D11}"/>
-              </a:ext>
-            </a:extLst>
-          </p:cNvPr>
+          <p:cNvPr id="4" name="Text Placeholder 3"/>
           <p:cNvSpPr>
             <a:spLocks noGrp="1"/>
           </p:cNvSpPr>
@@ -8270,8 +7968,8 @@
         </p:nvSpPr>
         <p:spPr>
           <a:xfrm>
-            <a:off x="839788" y="2057400"/>
-            <a:ext cx="3932237" cy="3811588"/>
+            <a:off x="1259683" y="2057400"/>
+            <a:ext cx="5898356" cy="3811588"/>
           </a:xfrm>
         </p:spPr>
         <p:txBody>
@@ -8325,13 +8023,7 @@
       </p:sp>
       <p:sp>
         <p:nvSpPr>
-          <p:cNvPr id="5" name="Date Placeholder 4">
-            <a:extLst>
-              <a:ext uri="{FF2B5EF4-FFF2-40B4-BE49-F238E27FC236}">
-                <a16:creationId xmlns:a16="http://schemas.microsoft.com/office/drawing/2014/main" id="{7C495367-F63E-E50B-B7D4-2E6036E05346}"/>
-              </a:ext>
-            </a:extLst>
-          </p:cNvPr>
+          <p:cNvPr id="5" name="Date Placeholder 4"/>
           <p:cNvSpPr>
             <a:spLocks noGrp="1"/>
           </p:cNvSpPr>
@@ -8346,7 +8038,7 @@
           <a:p>
             <a:fld id="{B6C7B70F-B9BD-40CD-A497-1FA080680CDD}" type="datetimeFigureOut">
               <a:rPr lang="en-US" smtClean="0"/>
-              <a:t>3/2/2023</a:t>
+              <a:t>3/22/2023</a:t>
             </a:fld>
             <a:endParaRPr lang="en-US"/>
           </a:p>
@@ -8354,13 +8046,7 @@
       </p:sp>
       <p:sp>
         <p:nvSpPr>
-          <p:cNvPr id="6" name="Footer Placeholder 5">
-            <a:extLst>
-              <a:ext uri="{FF2B5EF4-FFF2-40B4-BE49-F238E27FC236}">
-                <a16:creationId xmlns:a16="http://schemas.microsoft.com/office/drawing/2014/main" id="{26C723F5-36E3-30E3-FC9F-B95EF4221BEA}"/>
-              </a:ext>
-            </a:extLst>
-          </p:cNvPr>
+          <p:cNvPr id="6" name="Footer Placeholder 5"/>
           <p:cNvSpPr>
             <a:spLocks noGrp="1"/>
           </p:cNvSpPr>
@@ -8379,13 +8065,7 @@
       </p:sp>
       <p:sp>
         <p:nvSpPr>
-          <p:cNvPr id="7" name="Slide Number Placeholder 6">
-            <a:extLst>
-              <a:ext uri="{FF2B5EF4-FFF2-40B4-BE49-F238E27FC236}">
-                <a16:creationId xmlns:a16="http://schemas.microsoft.com/office/drawing/2014/main" id="{FA27181C-2FB8-6994-E957-05F9FE9D52D2}"/>
-              </a:ext>
-            </a:extLst>
-          </p:cNvPr>
+          <p:cNvPr id="7" name="Slide Number Placeholder 6"/>
           <p:cNvSpPr>
             <a:spLocks noGrp="1"/>
           </p:cNvSpPr>
@@ -8409,7 +8089,7 @@
     </p:spTree>
     <p:extLst>
       <p:ext uri="{BB962C8B-B14F-4D97-AF65-F5344CB8AC3E}">
-        <p14:creationId xmlns:p14="http://schemas.microsoft.com/office/powerpoint/2010/main" val="2340033644"/>
+        <p14:creationId xmlns:p14="http://schemas.microsoft.com/office/powerpoint/2010/main" val="2132192172"/>
       </p:ext>
     </p:extLst>
   </p:cSld>
@@ -8443,13 +8123,7 @@
       </p:grpSpPr>
       <p:sp>
         <p:nvSpPr>
-          <p:cNvPr id="2" name="Title Placeholder 1">
-            <a:extLst>
-              <a:ext uri="{FF2B5EF4-FFF2-40B4-BE49-F238E27FC236}">
-                <a16:creationId xmlns:a16="http://schemas.microsoft.com/office/drawing/2014/main" id="{DCF7A959-04B8-7434-51D8-5CE593AECD17}"/>
-              </a:ext>
-            </a:extLst>
-          </p:cNvPr>
+          <p:cNvPr id="2" name="Title Placeholder 1"/>
           <p:cNvSpPr>
             <a:spLocks noGrp="1"/>
           </p:cNvSpPr>
@@ -8459,8 +8133,8 @@
         </p:nvSpPr>
         <p:spPr>
           <a:xfrm>
-            <a:off x="838200" y="365125"/>
-            <a:ext cx="10515600" cy="1325563"/>
+            <a:off x="1257300" y="365126"/>
+            <a:ext cx="15773400" cy="1325563"/>
           </a:xfrm>
           <a:prstGeom prst="rect">
             <a:avLst/>
@@ -8476,18 +8150,13 @@
               <a:rPr lang="en-US"/>
               <a:t>Click to edit Master title style</a:t>
             </a:r>
+            <a:endParaRPr lang="en-US" dirty="0"/>
           </a:p>
         </p:txBody>
       </p:sp>
       <p:sp>
         <p:nvSpPr>
-          <p:cNvPr id="3" name="Text Placeholder 2">
-            <a:extLst>
-              <a:ext uri="{FF2B5EF4-FFF2-40B4-BE49-F238E27FC236}">
-                <a16:creationId xmlns:a16="http://schemas.microsoft.com/office/drawing/2014/main" id="{CA3AA2A4-FE1F-05C4-BCB3-D07AD6C6048D}"/>
-              </a:ext>
-            </a:extLst>
-          </p:cNvPr>
+          <p:cNvPr id="3" name="Text Placeholder 2"/>
           <p:cNvSpPr>
             <a:spLocks noGrp="1"/>
           </p:cNvSpPr>
@@ -8497,8 +8166,8 @@
         </p:nvSpPr>
         <p:spPr>
           <a:xfrm>
-            <a:off x="838200" y="1825625"/>
-            <a:ext cx="10515600" cy="4351338"/>
+            <a:off x="1257300" y="1825625"/>
+            <a:ext cx="15773400" cy="4351338"/>
           </a:xfrm>
           <a:prstGeom prst="rect">
             <a:avLst/>
@@ -8543,18 +8212,13 @@
               <a:rPr lang="en-US"/>
               <a:t>Fifth level</a:t>
             </a:r>
+            <a:endParaRPr lang="en-US" dirty="0"/>
           </a:p>
         </p:txBody>
       </p:sp>
       <p:sp>
         <p:nvSpPr>
-          <p:cNvPr id="4" name="Date Placeholder 3">
-            <a:extLst>
-              <a:ext uri="{FF2B5EF4-FFF2-40B4-BE49-F238E27FC236}">
-                <a16:creationId xmlns:a16="http://schemas.microsoft.com/office/drawing/2014/main" id="{DA5FDB33-FFC0-F8D8-3121-9368736F6DFA}"/>
-              </a:ext>
-            </a:extLst>
-          </p:cNvPr>
+          <p:cNvPr id="4" name="Date Placeholder 3"/>
           <p:cNvSpPr>
             <a:spLocks noGrp="1"/>
           </p:cNvSpPr>
@@ -8564,8 +8228,8 @@
         </p:nvSpPr>
         <p:spPr>
           <a:xfrm>
-            <a:off x="838200" y="6356350"/>
-            <a:ext cx="2743200" cy="365125"/>
+            <a:off x="1257300" y="6356351"/>
+            <a:ext cx="4114800" cy="365125"/>
           </a:xfrm>
           <a:prstGeom prst="rect">
             <a:avLst/>
@@ -8587,7 +8251,7 @@
           <a:p>
             <a:fld id="{B6C7B70F-B9BD-40CD-A497-1FA080680CDD}" type="datetimeFigureOut">
               <a:rPr lang="en-US" smtClean="0"/>
-              <a:t>3/2/2023</a:t>
+              <a:t>3/22/2023</a:t>
             </a:fld>
             <a:endParaRPr lang="en-US"/>
           </a:p>
@@ -8595,13 +8259,7 @@
       </p:sp>
       <p:sp>
         <p:nvSpPr>
-          <p:cNvPr id="5" name="Footer Placeholder 4">
-            <a:extLst>
-              <a:ext uri="{FF2B5EF4-FFF2-40B4-BE49-F238E27FC236}">
-                <a16:creationId xmlns:a16="http://schemas.microsoft.com/office/drawing/2014/main" id="{648B6EB7-C064-9EA3-C691-075EF7D58176}"/>
-              </a:ext>
-            </a:extLst>
-          </p:cNvPr>
+          <p:cNvPr id="5" name="Footer Placeholder 4"/>
           <p:cNvSpPr>
             <a:spLocks noGrp="1"/>
           </p:cNvSpPr>
@@ -8611,8 +8269,8 @@
         </p:nvSpPr>
         <p:spPr>
           <a:xfrm>
-            <a:off x="4038600" y="6356350"/>
-            <a:ext cx="4114800" cy="365125"/>
+            <a:off x="6057900" y="6356351"/>
+            <a:ext cx="6172200" cy="365125"/>
           </a:xfrm>
           <a:prstGeom prst="rect">
             <a:avLst/>
@@ -8638,13 +8296,7 @@
       </p:sp>
       <p:sp>
         <p:nvSpPr>
-          <p:cNvPr id="6" name="Slide Number Placeholder 5">
-            <a:extLst>
-              <a:ext uri="{FF2B5EF4-FFF2-40B4-BE49-F238E27FC236}">
-                <a16:creationId xmlns:a16="http://schemas.microsoft.com/office/drawing/2014/main" id="{AADBEFA4-7D28-795E-DCBF-A8647FBFB49D}"/>
-              </a:ext>
-            </a:extLst>
-          </p:cNvPr>
+          <p:cNvPr id="6" name="Slide Number Placeholder 5"/>
           <p:cNvSpPr>
             <a:spLocks noGrp="1"/>
           </p:cNvSpPr>
@@ -8654,8 +8306,8 @@
         </p:nvSpPr>
         <p:spPr>
           <a:xfrm>
-            <a:off x="8610600" y="6356350"/>
-            <a:ext cx="2743200" cy="365125"/>
+            <a:off x="12915900" y="6356351"/>
+            <a:ext cx="4114800" cy="365125"/>
           </a:xfrm>
           <a:prstGeom prst="rect">
             <a:avLst/>
@@ -8686,23 +8338,23 @@
     </p:spTree>
     <p:extLst>
       <p:ext uri="{BB962C8B-B14F-4D97-AF65-F5344CB8AC3E}">
-        <p14:creationId xmlns:p14="http://schemas.microsoft.com/office/powerpoint/2010/main" val="1337579103"/>
+        <p14:creationId xmlns:p14="http://schemas.microsoft.com/office/powerpoint/2010/main" val="805564799"/>
       </p:ext>
     </p:extLst>
   </p:cSld>
   <p:clrMap bg1="lt1" tx1="dk1" bg2="lt2" tx2="dk2" accent1="accent1" accent2="accent2" accent3="accent3" accent4="accent4" accent5="accent5" accent6="accent6" hlink="hlink" folHlink="folHlink"/>
   <p:sldLayoutIdLst>
-    <p:sldLayoutId id="2147483649" r:id="rId1"/>
-    <p:sldLayoutId id="2147483650" r:id="rId2"/>
-    <p:sldLayoutId id="2147483651" r:id="rId3"/>
-    <p:sldLayoutId id="2147483652" r:id="rId4"/>
-    <p:sldLayoutId id="2147483653" r:id="rId5"/>
-    <p:sldLayoutId id="2147483654" r:id="rId6"/>
-    <p:sldLayoutId id="2147483655" r:id="rId7"/>
-    <p:sldLayoutId id="2147483656" r:id="rId8"/>
-    <p:sldLayoutId id="2147483657" r:id="rId9"/>
-    <p:sldLayoutId id="2147483658" r:id="rId10"/>
-    <p:sldLayoutId id="2147483659" r:id="rId11"/>
+    <p:sldLayoutId id="2147483661" r:id="rId1"/>
+    <p:sldLayoutId id="2147483662" r:id="rId2"/>
+    <p:sldLayoutId id="2147483663" r:id="rId3"/>
+    <p:sldLayoutId id="2147483664" r:id="rId4"/>
+    <p:sldLayoutId id="2147483665" r:id="rId5"/>
+    <p:sldLayoutId id="2147483666" r:id="rId6"/>
+    <p:sldLayoutId id="2147483667" r:id="rId7"/>
+    <p:sldLayoutId id="2147483668" r:id="rId8"/>
+    <p:sldLayoutId id="2147483669" r:id="rId9"/>
+    <p:sldLayoutId id="2147483670" r:id="rId10"/>
+    <p:sldLayoutId id="2147483671" r:id="rId11"/>
   </p:sldLayoutIdLst>
   <p:txStyles>
     <p:titleStyle>
@@ -9076,7 +8728,7 @@
         </p:blipFill>
         <p:spPr>
           <a:xfrm>
-            <a:off x="128991" y="1316736"/>
+            <a:off x="582503" y="1316736"/>
             <a:ext cx="7795809" cy="4181856"/>
           </a:xfrm>
           <a:prstGeom prst="rect">
@@ -9084,196 +8736,6 @@
           </a:prstGeom>
         </p:spPr>
       </p:pic>
-      <p:cxnSp>
-        <p:nvCxnSpPr>
-          <p:cNvPr id="6" name="Straight Connector 5">
-            <a:extLst>
-              <a:ext uri="{FF2B5EF4-FFF2-40B4-BE49-F238E27FC236}">
-                <a16:creationId xmlns:a16="http://schemas.microsoft.com/office/drawing/2014/main" id="{7FF289B6-311D-955F-12DA-08E17F599946}"/>
-              </a:ext>
-            </a:extLst>
-          </p:cNvPr>
-          <p:cNvCxnSpPr>
-            <a:cxnSpLocks/>
-          </p:cNvCxnSpPr>
-          <p:nvPr/>
-        </p:nvCxnSpPr>
-        <p:spPr>
-          <a:xfrm>
-            <a:off x="3852672" y="2523744"/>
-            <a:ext cx="3834384" cy="0"/>
-          </a:xfrm>
-          <a:prstGeom prst="line">
-            <a:avLst/>
-          </a:prstGeom>
-          <a:ln w="19050">
-            <a:solidFill>
-              <a:schemeClr val="tx1">
-                <a:lumMod val="50000"/>
-                <a:lumOff val="50000"/>
-              </a:schemeClr>
-            </a:solidFill>
-            <a:prstDash val="dash"/>
-          </a:ln>
-        </p:spPr>
-        <p:style>
-          <a:lnRef idx="1">
-            <a:schemeClr val="accent1"/>
-          </a:lnRef>
-          <a:fillRef idx="0">
-            <a:schemeClr val="accent1"/>
-          </a:fillRef>
-          <a:effectRef idx="0">
-            <a:schemeClr val="accent1"/>
-          </a:effectRef>
-          <a:fontRef idx="minor">
-            <a:schemeClr val="tx1"/>
-          </a:fontRef>
-        </p:style>
-      </p:cxnSp>
-      <p:cxnSp>
-        <p:nvCxnSpPr>
-          <p:cNvPr id="7" name="Straight Connector 6">
-            <a:extLst>
-              <a:ext uri="{FF2B5EF4-FFF2-40B4-BE49-F238E27FC236}">
-                <a16:creationId xmlns:a16="http://schemas.microsoft.com/office/drawing/2014/main" id="{FE4427E5-44BD-46E3-8EBA-4F41FF651150}"/>
-              </a:ext>
-            </a:extLst>
-          </p:cNvPr>
-          <p:cNvCxnSpPr>
-            <a:cxnSpLocks/>
-          </p:cNvCxnSpPr>
-          <p:nvPr/>
-        </p:nvCxnSpPr>
-        <p:spPr>
-          <a:xfrm>
-            <a:off x="3700272" y="1749552"/>
-            <a:ext cx="3986784" cy="0"/>
-          </a:xfrm>
-          <a:prstGeom prst="line">
-            <a:avLst/>
-          </a:prstGeom>
-          <a:ln w="19050">
-            <a:solidFill>
-              <a:schemeClr val="tx1">
-                <a:lumMod val="50000"/>
-                <a:lumOff val="50000"/>
-              </a:schemeClr>
-            </a:solidFill>
-            <a:prstDash val="dash"/>
-          </a:ln>
-        </p:spPr>
-        <p:style>
-          <a:lnRef idx="1">
-            <a:schemeClr val="accent1"/>
-          </a:lnRef>
-          <a:fillRef idx="0">
-            <a:schemeClr val="accent1"/>
-          </a:fillRef>
-          <a:effectRef idx="0">
-            <a:schemeClr val="accent1"/>
-          </a:effectRef>
-          <a:fontRef idx="minor">
-            <a:schemeClr val="tx1"/>
-          </a:fontRef>
-        </p:style>
-      </p:cxnSp>
-      <p:cxnSp>
-        <p:nvCxnSpPr>
-          <p:cNvPr id="10" name="Straight Connector 9">
-            <a:extLst>
-              <a:ext uri="{FF2B5EF4-FFF2-40B4-BE49-F238E27FC236}">
-                <a16:creationId xmlns:a16="http://schemas.microsoft.com/office/drawing/2014/main" id="{2B448934-6AFC-42B9-5D89-A26E61056FC1}"/>
-              </a:ext>
-            </a:extLst>
-          </p:cNvPr>
-          <p:cNvCxnSpPr>
-            <a:cxnSpLocks/>
-          </p:cNvCxnSpPr>
-          <p:nvPr/>
-        </p:nvCxnSpPr>
-        <p:spPr>
-          <a:xfrm>
-            <a:off x="3694176" y="5187696"/>
-            <a:ext cx="3992880" cy="0"/>
-          </a:xfrm>
-          <a:prstGeom prst="line">
-            <a:avLst/>
-          </a:prstGeom>
-          <a:ln w="19050">
-            <a:solidFill>
-              <a:schemeClr val="tx1">
-                <a:lumMod val="50000"/>
-                <a:lumOff val="50000"/>
-              </a:schemeClr>
-            </a:solidFill>
-            <a:prstDash val="dash"/>
-          </a:ln>
-        </p:spPr>
-        <p:style>
-          <a:lnRef idx="1">
-            <a:schemeClr val="accent1"/>
-          </a:lnRef>
-          <a:fillRef idx="0">
-            <a:schemeClr val="accent1"/>
-          </a:fillRef>
-          <a:effectRef idx="0">
-            <a:schemeClr val="accent1"/>
-          </a:effectRef>
-          <a:fontRef idx="minor">
-            <a:schemeClr val="tx1"/>
-          </a:fontRef>
-        </p:style>
-      </p:cxnSp>
-      <p:sp>
-        <p:nvSpPr>
-          <p:cNvPr id="22" name="Right Brace 21">
-            <a:extLst>
-              <a:ext uri="{FF2B5EF4-FFF2-40B4-BE49-F238E27FC236}">
-                <a16:creationId xmlns:a16="http://schemas.microsoft.com/office/drawing/2014/main" id="{97833484-BA77-E9E7-0040-D045175E61C5}"/>
-              </a:ext>
-            </a:extLst>
-          </p:cNvPr>
-          <p:cNvSpPr/>
-          <p:nvPr/>
-        </p:nvSpPr>
-        <p:spPr>
-          <a:xfrm>
-            <a:off x="7819644" y="1761745"/>
-            <a:ext cx="256032" cy="719482"/>
-          </a:xfrm>
-          <a:prstGeom prst="rightBrace">
-            <a:avLst/>
-          </a:prstGeom>
-          <a:ln w="19050">
-            <a:solidFill>
-              <a:schemeClr val="tx1"/>
-            </a:solidFill>
-          </a:ln>
-        </p:spPr>
-        <p:style>
-          <a:lnRef idx="1">
-            <a:schemeClr val="accent1"/>
-          </a:lnRef>
-          <a:fillRef idx="0">
-            <a:schemeClr val="accent1"/>
-          </a:fillRef>
-          <a:effectRef idx="0">
-            <a:schemeClr val="accent1"/>
-          </a:effectRef>
-          <a:fontRef idx="minor">
-            <a:schemeClr val="tx1"/>
-          </a:fontRef>
-        </p:style>
-        <p:txBody>
-          <a:bodyPr rtlCol="0" anchor="ctr"/>
-          <a:lstStyle/>
-          <a:p>
-            <a:pPr algn="ctr"/>
-            <a:endParaRPr lang="en-US"/>
-          </a:p>
-        </p:txBody>
-      </p:sp>
       <p:sp>
         <p:nvSpPr>
           <p:cNvPr id="23" name="TextBox 22">
@@ -9288,7 +8750,7 @@
         </p:nvSpPr>
         <p:spPr>
           <a:xfrm>
-            <a:off x="8075676" y="1798320"/>
+            <a:off x="10196525" y="1477426"/>
             <a:ext cx="1914144" cy="646331"/>
           </a:xfrm>
           <a:prstGeom prst="rect">
@@ -9347,7 +8809,7 @@
         </p:nvSpPr>
         <p:spPr>
           <a:xfrm>
-            <a:off x="8075676" y="3535639"/>
+            <a:off x="10976064" y="4995139"/>
             <a:ext cx="2151888" cy="646331"/>
           </a:xfrm>
           <a:prstGeom prst="rect">
@@ -9394,55 +8856,6 @@
       </p:sp>
       <p:sp>
         <p:nvSpPr>
-          <p:cNvPr id="25" name="Right Brace 24">
-            <a:extLst>
-              <a:ext uri="{FF2B5EF4-FFF2-40B4-BE49-F238E27FC236}">
-                <a16:creationId xmlns:a16="http://schemas.microsoft.com/office/drawing/2014/main" id="{5FF55EC9-DABB-BAF3-13C5-5BB2FD4E94E1}"/>
-              </a:ext>
-            </a:extLst>
-          </p:cNvPr>
-          <p:cNvSpPr/>
-          <p:nvPr/>
-        </p:nvSpPr>
-        <p:spPr>
-          <a:xfrm>
-            <a:off x="7827264" y="2542184"/>
-            <a:ext cx="256032" cy="2633243"/>
-          </a:xfrm>
-          <a:prstGeom prst="rightBrace">
-            <a:avLst/>
-          </a:prstGeom>
-          <a:ln w="19050">
-            <a:solidFill>
-              <a:schemeClr val="tx1"/>
-            </a:solidFill>
-          </a:ln>
-        </p:spPr>
-        <p:style>
-          <a:lnRef idx="1">
-            <a:schemeClr val="accent1"/>
-          </a:lnRef>
-          <a:fillRef idx="0">
-            <a:schemeClr val="accent1"/>
-          </a:fillRef>
-          <a:effectRef idx="0">
-            <a:schemeClr val="accent1"/>
-          </a:effectRef>
-          <a:fontRef idx="minor">
-            <a:schemeClr val="tx1"/>
-          </a:fontRef>
-        </p:style>
-        <p:txBody>
-          <a:bodyPr rtlCol="0" anchor="ctr"/>
-          <a:lstStyle/>
-          <a:p>
-            <a:pPr algn="ctr"/>
-            <a:endParaRPr lang="en-US"/>
-          </a:p>
-        </p:txBody>
-      </p:sp>
-      <p:sp>
-        <p:nvSpPr>
           <p:cNvPr id="26" name="Rectangle 25">
             <a:extLst>
               <a:ext uri="{FF2B5EF4-FFF2-40B4-BE49-F238E27FC236}">
@@ -9455,7 +8868,7 @@
         </p:nvSpPr>
         <p:spPr>
           <a:xfrm>
-            <a:off x="646176" y="3596676"/>
+            <a:off x="1099687" y="3596676"/>
             <a:ext cx="1524000" cy="402336"/>
           </a:xfrm>
           <a:prstGeom prst="rect">
@@ -9507,7 +8920,7 @@
         </p:nvSpPr>
         <p:spPr>
           <a:xfrm>
-            <a:off x="3230880" y="2663988"/>
+            <a:off x="3684391" y="2663988"/>
             <a:ext cx="384048" cy="402336"/>
           </a:xfrm>
           <a:prstGeom prst="rect">
@@ -9559,7 +8972,7 @@
         </p:nvSpPr>
         <p:spPr>
           <a:xfrm>
-            <a:off x="2859024" y="4248984"/>
+            <a:off x="3312535" y="4248984"/>
             <a:ext cx="518160" cy="402336"/>
           </a:xfrm>
           <a:prstGeom prst="rect">
@@ -9611,7 +9024,7 @@
         </p:nvSpPr>
         <p:spPr>
           <a:xfrm>
-            <a:off x="2846832" y="4236792"/>
+            <a:off x="3300343" y="4236792"/>
             <a:ext cx="563880" cy="369332"/>
           </a:xfrm>
           <a:prstGeom prst="rect">
@@ -9660,7 +9073,7 @@
         </p:nvSpPr>
         <p:spPr>
           <a:xfrm>
-            <a:off x="4137660" y="4181970"/>
+            <a:off x="4591171" y="4181970"/>
             <a:ext cx="563880" cy="369332"/>
           </a:xfrm>
           <a:prstGeom prst="rect">
@@ -9709,8 +9122,8 @@
         </p:nvSpPr>
         <p:spPr>
           <a:xfrm>
-            <a:off x="8124444" y="3523559"/>
-            <a:ext cx="1914144" cy="694983"/>
+            <a:off x="10976063" y="4983059"/>
+            <a:ext cx="2041955" cy="672945"/>
           </a:xfrm>
           <a:prstGeom prst="rect">
             <a:avLst/>
@@ -9761,8 +9174,8 @@
         </p:nvSpPr>
         <p:spPr>
           <a:xfrm>
-            <a:off x="8105394" y="1798355"/>
-            <a:ext cx="1884426" cy="634103"/>
+            <a:off x="10187320" y="1474079"/>
+            <a:ext cx="1884426" cy="678074"/>
           </a:xfrm>
           <a:prstGeom prst="rect">
             <a:avLst/>
@@ -9799,6 +9212,611 @@
           </a:p>
         </p:txBody>
       </p:sp>
+      <p:pic>
+        <p:nvPicPr>
+          <p:cNvPr id="2" name="Picture 1">
+            <a:extLst>
+              <a:ext uri="{FF2B5EF4-FFF2-40B4-BE49-F238E27FC236}">
+                <a16:creationId xmlns:a16="http://schemas.microsoft.com/office/drawing/2014/main" id="{38E9AB7B-8A36-6752-FCFD-653575DD2117}"/>
+              </a:ext>
+            </a:extLst>
+          </p:cNvPr>
+          <p:cNvPicPr>
+            <a:picLocks noChangeAspect="1"/>
+          </p:cNvPicPr>
+          <p:nvPr/>
+        </p:nvPicPr>
+        <p:blipFill>
+          <a:blip r:embed="rId4"/>
+          <a:stretch>
+            <a:fillRect/>
+          </a:stretch>
+        </p:blipFill>
+        <p:spPr>
+          <a:xfrm>
+            <a:off x="9133320" y="4183524"/>
+            <a:ext cx="2355762" cy="677424"/>
+          </a:xfrm>
+          <a:prstGeom prst="rect">
+            <a:avLst/>
+          </a:prstGeom>
+        </p:spPr>
+      </p:pic>
+      <p:pic>
+        <p:nvPicPr>
+          <p:cNvPr id="3" name="Picture 2">
+            <a:extLst>
+              <a:ext uri="{FF2B5EF4-FFF2-40B4-BE49-F238E27FC236}">
+                <a16:creationId xmlns:a16="http://schemas.microsoft.com/office/drawing/2014/main" id="{A1C28FDE-C779-77A0-73E0-A9D7C9D11E23}"/>
+              </a:ext>
+            </a:extLst>
+          </p:cNvPr>
+          <p:cNvPicPr>
+            <a:picLocks noChangeAspect="1"/>
+          </p:cNvPicPr>
+          <p:nvPr/>
+        </p:nvPicPr>
+        <p:blipFill rotWithShape="1">
+          <a:blip r:embed="rId5" cstate="print">
+            <a:extLst>
+              <a:ext uri="{BEBA8EAE-BF5A-486C-A8C5-ECC9F3942E4B}">
+                <a14:imgProps xmlns:a14="http://schemas.microsoft.com/office/drawing/2010/main">
+                  <a14:imgLayer r:embed="rId6">
+                    <a14:imgEffect>
+                      <a14:backgroundRemoval t="20308" b="91077" l="6466" r="97101">
+                        <a14:foregroundMark x1="9810" y1="46769" x2="6577" y2="66154"/>
+                        <a14:foregroundMark x1="6577" y1="66154" x2="13601" y2="70769"/>
+                        <a14:foregroundMark x1="13601" y1="70769" x2="12040" y2="48308"/>
+                        <a14:foregroundMark x1="12040" y1="48308" x2="10368" y2="46769"/>
+                        <a14:foregroundMark x1="87068" y1="41231" x2="92977" y2="23692"/>
+                        <a14:foregroundMark x1="92977" y1="23692" x2="95987" y2="44308"/>
+                        <a14:foregroundMark x1="95987" y1="44308" x2="88071" y2="51692"/>
+                        <a14:foregroundMark x1="88071" y1="51692" x2="87514" y2="50154"/>
+                        <a14:foregroundMark x1="91973" y1="26154" x2="97101" y2="41846"/>
+                        <a14:foregroundMark x1="97101" y1="41846" x2="93980" y2="52000"/>
+                        <a14:foregroundMark x1="86511" y1="43077" x2="91416" y2="25231"/>
+                        <a14:foregroundMark x1="91416" y1="25231" x2="92419" y2="23077"/>
+                        <a14:foregroundMark x1="23077" y1="44615" x2="32887" y2="42462"/>
+                        <a14:foregroundMark x1="32887" y1="42462" x2="58082" y2="44000"/>
+                        <a14:foregroundMark x1="58082" y1="44000" x2="69677" y2="43077"/>
+                        <a14:foregroundMark x1="69677" y1="43077" x2="78707" y2="44308"/>
+                        <a14:foregroundMark x1="78707" y1="44308" x2="83946" y2="43692"/>
+                        <a14:foregroundMark x1="30881" y1="68000" x2="47492" y2="68615"/>
+                        <a14:foregroundMark x1="47492" y1="68615" x2="49944" y2="68000"/>
+                        <a14:foregroundMark x1="35117" y1="68615" x2="50502" y2="71077"/>
+                        <a14:foregroundMark x1="50502" y1="71077" x2="53735" y2="68615"/>
+                        <a14:foregroundMark x1="40803" y1="76308" x2="78818" y2="56308"/>
+                        <a14:foregroundMark x1="54849" y1="74462" x2="69119" y2="71692"/>
+                        <a14:foregroundMark x1="69119" y1="71692" x2="82720" y2="54769"/>
+                        <a14:foregroundMark x1="82634" y1="55000" x2="86511" y2="44615"/>
+                        <a14:foregroundMark x1="46042" y1="74154" x2="53177" y2="76000"/>
+                        <a14:foregroundMark x1="53177" y1="76000" x2="56299" y2="75077"/>
+                        <a14:foregroundMark x1="32664" y1="68000" x2="41137" y2="73538"/>
+                        <a14:foregroundMark x1="83835" y1="44000" x2="88517" y2="38154"/>
+                        <a14:foregroundMark x1="84062" y1="53876" x2="88183" y2="48923"/>
+                        <a14:foregroundMark x1="81271" y1="57231" x2="82494" y2="55761"/>
+                        <a14:foregroundMark x1="85507" y1="52615" x2="88852" y2="50769"/>
+                        <a14:backgroundMark x1="82609" y1="60000" x2="82609" y2="60000"/>
+                        <a14:backgroundMark x1="81717" y1="60000" x2="83278" y2="58154"/>
+                      </a14:backgroundRemoval>
+                    </a14:imgEffect>
+                    <a14:imgEffect>
+                      <a14:saturation sat="66000"/>
+                    </a14:imgEffect>
+                  </a14:imgLayer>
+                </a14:imgProps>
+              </a:ext>
+              <a:ext uri="{28A0092B-C50C-407E-A947-70E740481C1C}">
+                <a14:useLocalDpi xmlns:a14="http://schemas.microsoft.com/office/drawing/2010/main" val="0"/>
+              </a:ext>
+            </a:extLst>
+          </a:blip>
+          <a:srcRect t="11827"/>
+          <a:stretch/>
+        </p:blipFill>
+        <p:spPr>
+          <a:xfrm>
+            <a:off x="12646814" y="3688294"/>
+            <a:ext cx="2118425" cy="677424"/>
+          </a:xfrm>
+          <a:prstGeom prst="rect">
+            <a:avLst/>
+          </a:prstGeom>
+          <a:ln>
+            <a:noFill/>
+          </a:ln>
+        </p:spPr>
+      </p:pic>
+      <p:pic>
+        <p:nvPicPr>
+          <p:cNvPr id="5" name="Picture 4">
+            <a:extLst>
+              <a:ext uri="{FF2B5EF4-FFF2-40B4-BE49-F238E27FC236}">
+                <a16:creationId xmlns:a16="http://schemas.microsoft.com/office/drawing/2014/main" id="{5D0484BD-DF49-2DF5-EA57-B72EDF153261}"/>
+              </a:ext>
+            </a:extLst>
+          </p:cNvPr>
+          <p:cNvPicPr>
+            <a:picLocks noChangeAspect="1"/>
+          </p:cNvPicPr>
+          <p:nvPr/>
+        </p:nvPicPr>
+        <p:blipFill>
+          <a:blip r:embed="rId7"/>
+          <a:stretch>
+            <a:fillRect/>
+          </a:stretch>
+        </p:blipFill>
+        <p:spPr>
+          <a:xfrm>
+            <a:off x="11490869" y="2332875"/>
+            <a:ext cx="496080" cy="463852"/>
+          </a:xfrm>
+          <a:prstGeom prst="rect">
+            <a:avLst/>
+          </a:prstGeom>
+        </p:spPr>
+      </p:pic>
+      <p:sp>
+        <p:nvSpPr>
+          <p:cNvPr id="8" name="Arc 7">
+            <a:extLst>
+              <a:ext uri="{FF2B5EF4-FFF2-40B4-BE49-F238E27FC236}">
+                <a16:creationId xmlns:a16="http://schemas.microsoft.com/office/drawing/2014/main" id="{7A5B6F6B-5ED2-73C6-144D-8AD945308517}"/>
+              </a:ext>
+            </a:extLst>
+          </p:cNvPr>
+          <p:cNvSpPr/>
+          <p:nvPr/>
+        </p:nvSpPr>
+        <p:spPr>
+          <a:xfrm rot="20906546">
+            <a:off x="11732619" y="2617577"/>
+            <a:ext cx="1687582" cy="2642887"/>
+          </a:xfrm>
+          <a:prstGeom prst="arc">
+            <a:avLst>
+              <a:gd name="adj1" fmla="val 16200000"/>
+              <a:gd name="adj2" fmla="val 21063990"/>
+            </a:avLst>
+          </a:prstGeom>
+          <a:ln w="38100">
+            <a:solidFill>
+              <a:schemeClr val="tx1"/>
+            </a:solidFill>
+          </a:ln>
+        </p:spPr>
+        <p:style>
+          <a:lnRef idx="1">
+            <a:schemeClr val="accent1"/>
+          </a:lnRef>
+          <a:fillRef idx="0">
+            <a:schemeClr val="accent1"/>
+          </a:fillRef>
+          <a:effectRef idx="0">
+            <a:schemeClr val="accent1"/>
+          </a:effectRef>
+          <a:fontRef idx="minor">
+            <a:schemeClr val="tx1"/>
+          </a:fontRef>
+        </p:style>
+        <p:txBody>
+          <a:bodyPr rtlCol="0" anchor="ctr"/>
+          <a:lstStyle/>
+          <a:p>
+            <a:pPr algn="ctr"/>
+            <a:endParaRPr lang="en-US"/>
+          </a:p>
+        </p:txBody>
+      </p:sp>
+      <p:sp>
+        <p:nvSpPr>
+          <p:cNvPr id="9" name="Isosceles Triangle 8">
+            <a:extLst>
+              <a:ext uri="{FF2B5EF4-FFF2-40B4-BE49-F238E27FC236}">
+                <a16:creationId xmlns:a16="http://schemas.microsoft.com/office/drawing/2014/main" id="{324FACF9-8D81-49DA-A087-3175469A11BF}"/>
+              </a:ext>
+            </a:extLst>
+          </p:cNvPr>
+          <p:cNvSpPr/>
+          <p:nvPr/>
+        </p:nvSpPr>
+        <p:spPr>
+          <a:xfrm rot="9935671">
+            <a:off x="13326149" y="3638834"/>
+            <a:ext cx="124660" cy="129329"/>
+          </a:xfrm>
+          <a:prstGeom prst="triangle">
+            <a:avLst/>
+          </a:prstGeom>
+          <a:solidFill>
+            <a:schemeClr val="tx1"/>
+          </a:solidFill>
+          <a:ln w="38100">
+            <a:solidFill>
+              <a:schemeClr val="tx1"/>
+            </a:solidFill>
+          </a:ln>
+        </p:spPr>
+        <p:style>
+          <a:lnRef idx="2">
+            <a:schemeClr val="accent1">
+              <a:shade val="50000"/>
+            </a:schemeClr>
+          </a:lnRef>
+          <a:fillRef idx="1">
+            <a:schemeClr val="accent1"/>
+          </a:fillRef>
+          <a:effectRef idx="0">
+            <a:schemeClr val="accent1"/>
+          </a:effectRef>
+          <a:fontRef idx="minor">
+            <a:schemeClr val="lt1"/>
+          </a:fontRef>
+        </p:style>
+        <p:txBody>
+          <a:bodyPr rtlCol="0" anchor="ctr"/>
+          <a:lstStyle/>
+          <a:p>
+            <a:pPr algn="ctr"/>
+            <a:endParaRPr lang="en-US"/>
+          </a:p>
+        </p:txBody>
+      </p:sp>
+      <p:sp>
+        <p:nvSpPr>
+          <p:cNvPr id="11" name="Arc 10">
+            <a:extLst>
+              <a:ext uri="{FF2B5EF4-FFF2-40B4-BE49-F238E27FC236}">
+                <a16:creationId xmlns:a16="http://schemas.microsoft.com/office/drawing/2014/main" id="{D714DC4B-8658-54A0-C75B-3408C15BE45E}"/>
+              </a:ext>
+            </a:extLst>
+          </p:cNvPr>
+          <p:cNvSpPr/>
+          <p:nvPr/>
+        </p:nvSpPr>
+        <p:spPr>
+          <a:xfrm rot="7935171">
+            <a:off x="10861524" y="2497331"/>
+            <a:ext cx="2464275" cy="2233989"/>
+          </a:xfrm>
+          <a:prstGeom prst="arc">
+            <a:avLst>
+              <a:gd name="adj1" fmla="val 16200000"/>
+              <a:gd name="adj2" fmla="val 19813336"/>
+            </a:avLst>
+          </a:prstGeom>
+          <a:ln w="38100">
+            <a:solidFill>
+              <a:schemeClr val="tx1"/>
+            </a:solidFill>
+          </a:ln>
+        </p:spPr>
+        <p:style>
+          <a:lnRef idx="1">
+            <a:schemeClr val="accent1"/>
+          </a:lnRef>
+          <a:fillRef idx="0">
+            <a:schemeClr val="accent1"/>
+          </a:fillRef>
+          <a:effectRef idx="0">
+            <a:schemeClr val="accent1"/>
+          </a:effectRef>
+          <a:fontRef idx="minor">
+            <a:schemeClr val="tx1"/>
+          </a:fontRef>
+        </p:style>
+        <p:txBody>
+          <a:bodyPr rtlCol="0" anchor="ctr"/>
+          <a:lstStyle/>
+          <a:p>
+            <a:pPr algn="ctr"/>
+            <a:endParaRPr lang="en-US"/>
+          </a:p>
+        </p:txBody>
+      </p:sp>
+      <p:sp>
+        <p:nvSpPr>
+          <p:cNvPr id="12" name="Isosceles Triangle 11">
+            <a:extLst>
+              <a:ext uri="{FF2B5EF4-FFF2-40B4-BE49-F238E27FC236}">
+                <a16:creationId xmlns:a16="http://schemas.microsoft.com/office/drawing/2014/main" id="{DC3D29A4-060B-ED37-DCDC-63AFDF822C67}"/>
+              </a:ext>
+            </a:extLst>
+          </p:cNvPr>
+          <p:cNvSpPr/>
+          <p:nvPr/>
+        </p:nvSpPr>
+        <p:spPr>
+          <a:xfrm rot="16602905">
+            <a:off x="11717581" y="4714482"/>
+            <a:ext cx="124660" cy="129329"/>
+          </a:xfrm>
+          <a:prstGeom prst="triangle">
+            <a:avLst/>
+          </a:prstGeom>
+          <a:solidFill>
+            <a:schemeClr val="tx1"/>
+          </a:solidFill>
+          <a:ln w="38100">
+            <a:solidFill>
+              <a:schemeClr val="tx1"/>
+            </a:solidFill>
+          </a:ln>
+        </p:spPr>
+        <p:style>
+          <a:lnRef idx="2">
+            <a:schemeClr val="accent1">
+              <a:shade val="50000"/>
+            </a:schemeClr>
+          </a:lnRef>
+          <a:fillRef idx="1">
+            <a:schemeClr val="accent1"/>
+          </a:fillRef>
+          <a:effectRef idx="0">
+            <a:schemeClr val="accent1"/>
+          </a:effectRef>
+          <a:fontRef idx="minor">
+            <a:schemeClr val="lt1"/>
+          </a:fontRef>
+        </p:style>
+        <p:txBody>
+          <a:bodyPr rtlCol="0" anchor="ctr"/>
+          <a:lstStyle/>
+          <a:p>
+            <a:pPr algn="ctr"/>
+            <a:endParaRPr lang="en-US"/>
+          </a:p>
+        </p:txBody>
+      </p:sp>
+      <p:sp>
+        <p:nvSpPr>
+          <p:cNvPr id="13" name="Arc 12">
+            <a:extLst>
+              <a:ext uri="{FF2B5EF4-FFF2-40B4-BE49-F238E27FC236}">
+                <a16:creationId xmlns:a16="http://schemas.microsoft.com/office/drawing/2014/main" id="{F6B2D2D0-2478-D4F1-C5B9-D895B745320D}"/>
+              </a:ext>
+            </a:extLst>
+          </p:cNvPr>
+          <p:cNvSpPr/>
+          <p:nvPr/>
+        </p:nvSpPr>
+        <p:spPr>
+          <a:xfrm rot="16507254">
+            <a:off x="10414616" y="2177473"/>
+            <a:ext cx="2780206" cy="3565885"/>
+          </a:xfrm>
+          <a:prstGeom prst="arc">
+            <a:avLst>
+              <a:gd name="adj1" fmla="val 15643757"/>
+              <a:gd name="adj2" fmla="val 19449537"/>
+            </a:avLst>
+          </a:prstGeom>
+          <a:ln w="38100">
+            <a:solidFill>
+              <a:schemeClr val="tx1"/>
+            </a:solidFill>
+          </a:ln>
+        </p:spPr>
+        <p:style>
+          <a:lnRef idx="1">
+            <a:schemeClr val="accent1"/>
+          </a:lnRef>
+          <a:fillRef idx="0">
+            <a:schemeClr val="accent1"/>
+          </a:fillRef>
+          <a:effectRef idx="0">
+            <a:schemeClr val="accent1"/>
+          </a:effectRef>
+          <a:fontRef idx="minor">
+            <a:schemeClr val="tx1"/>
+          </a:fontRef>
+        </p:style>
+        <p:txBody>
+          <a:bodyPr rtlCol="0" anchor="ctr"/>
+          <a:lstStyle/>
+          <a:p>
+            <a:pPr algn="ctr"/>
+            <a:endParaRPr lang="en-US"/>
+          </a:p>
+        </p:txBody>
+      </p:sp>
+      <p:sp>
+        <p:nvSpPr>
+          <p:cNvPr id="14" name="Isosceles Triangle 13">
+            <a:extLst>
+              <a:ext uri="{FF2B5EF4-FFF2-40B4-BE49-F238E27FC236}">
+                <a16:creationId xmlns:a16="http://schemas.microsoft.com/office/drawing/2014/main" id="{972E247F-537D-8A11-B93F-3ABAF280CD18}"/>
+              </a:ext>
+            </a:extLst>
+          </p:cNvPr>
+          <p:cNvSpPr/>
+          <p:nvPr/>
+        </p:nvSpPr>
+        <p:spPr>
+          <a:xfrm rot="4395725">
+            <a:off x="11051938" y="2582259"/>
+            <a:ext cx="124660" cy="129329"/>
+          </a:xfrm>
+          <a:prstGeom prst="triangle">
+            <a:avLst/>
+          </a:prstGeom>
+          <a:solidFill>
+            <a:schemeClr val="tx1"/>
+          </a:solidFill>
+          <a:ln w="38100">
+            <a:solidFill>
+              <a:schemeClr val="tx1"/>
+            </a:solidFill>
+          </a:ln>
+        </p:spPr>
+        <p:style>
+          <a:lnRef idx="2">
+            <a:schemeClr val="accent1">
+              <a:shade val="50000"/>
+            </a:schemeClr>
+          </a:lnRef>
+          <a:fillRef idx="1">
+            <a:schemeClr val="accent1"/>
+          </a:fillRef>
+          <a:effectRef idx="0">
+            <a:schemeClr val="accent1"/>
+          </a:effectRef>
+          <a:fontRef idx="minor">
+            <a:schemeClr val="lt1"/>
+          </a:fontRef>
+        </p:style>
+        <p:txBody>
+          <a:bodyPr rtlCol="0" anchor="ctr"/>
+          <a:lstStyle/>
+          <a:p>
+            <a:pPr algn="ctr"/>
+            <a:endParaRPr lang="en-US"/>
+          </a:p>
+        </p:txBody>
+      </p:sp>
+      <p:cxnSp>
+        <p:nvCxnSpPr>
+          <p:cNvPr id="16" name="Straight Connector 15">
+            <a:extLst>
+              <a:ext uri="{FF2B5EF4-FFF2-40B4-BE49-F238E27FC236}">
+                <a16:creationId xmlns:a16="http://schemas.microsoft.com/office/drawing/2014/main" id="{E535B04C-6B96-3C93-45B3-3E8F3E8351C5}"/>
+              </a:ext>
+            </a:extLst>
+          </p:cNvPr>
+          <p:cNvCxnSpPr>
+            <a:cxnSpLocks/>
+          </p:cNvCxnSpPr>
+          <p:nvPr/>
+        </p:nvCxnSpPr>
+        <p:spPr>
+          <a:xfrm>
+            <a:off x="8819914" y="3370735"/>
+            <a:ext cx="6003200" cy="0"/>
+          </a:xfrm>
+          <a:prstGeom prst="line">
+            <a:avLst/>
+          </a:prstGeom>
+          <a:ln w="28575">
+            <a:solidFill>
+              <a:schemeClr val="tx1">
+                <a:lumMod val="50000"/>
+                <a:lumOff val="50000"/>
+              </a:schemeClr>
+            </a:solidFill>
+            <a:prstDash val="lgDash"/>
+          </a:ln>
+        </p:spPr>
+        <p:style>
+          <a:lnRef idx="1">
+            <a:schemeClr val="accent1"/>
+          </a:lnRef>
+          <a:fillRef idx="0">
+            <a:schemeClr val="accent1"/>
+          </a:fillRef>
+          <a:effectRef idx="0">
+            <a:schemeClr val="accent1"/>
+          </a:effectRef>
+          <a:fontRef idx="minor">
+            <a:schemeClr val="tx1"/>
+          </a:fontRef>
+        </p:style>
+      </p:cxnSp>
+      <p:sp>
+        <p:nvSpPr>
+          <p:cNvPr id="20" name="Rectangle 19">
+            <a:extLst>
+              <a:ext uri="{FF2B5EF4-FFF2-40B4-BE49-F238E27FC236}">
+                <a16:creationId xmlns:a16="http://schemas.microsoft.com/office/drawing/2014/main" id="{5BEF30C1-B04E-D9B4-5A6B-9D9A44C1E1E8}"/>
+              </a:ext>
+            </a:extLst>
+          </p:cNvPr>
+          <p:cNvSpPr/>
+          <p:nvPr/>
+        </p:nvSpPr>
+        <p:spPr>
+          <a:xfrm>
+            <a:off x="706056" y="856527"/>
+            <a:ext cx="14479929" cy="5185458"/>
+          </a:xfrm>
+          <a:prstGeom prst="rect">
+            <a:avLst/>
+          </a:prstGeom>
+          <a:noFill/>
+          <a:ln>
+            <a:solidFill>
+              <a:schemeClr val="tx1"/>
+            </a:solidFill>
+          </a:ln>
+        </p:spPr>
+        <p:style>
+          <a:lnRef idx="2">
+            <a:schemeClr val="accent1">
+              <a:shade val="50000"/>
+            </a:schemeClr>
+          </a:lnRef>
+          <a:fillRef idx="1">
+            <a:schemeClr val="accent1"/>
+          </a:fillRef>
+          <a:effectRef idx="0">
+            <a:schemeClr val="accent1"/>
+          </a:effectRef>
+          <a:fontRef idx="minor">
+            <a:schemeClr val="lt1"/>
+          </a:fontRef>
+        </p:style>
+        <p:txBody>
+          <a:bodyPr rtlCol="0" anchor="ctr"/>
+          <a:lstStyle/>
+          <a:p>
+            <a:pPr algn="ctr"/>
+            <a:endParaRPr lang="en-US"/>
+          </a:p>
+        </p:txBody>
+      </p:sp>
+      <p:cxnSp>
+        <p:nvCxnSpPr>
+          <p:cNvPr id="29" name="Straight Connector 28">
+            <a:extLst>
+              <a:ext uri="{FF2B5EF4-FFF2-40B4-BE49-F238E27FC236}">
+                <a16:creationId xmlns:a16="http://schemas.microsoft.com/office/drawing/2014/main" id="{B2D6C927-2F4D-B50C-F07D-4180AE78346D}"/>
+              </a:ext>
+            </a:extLst>
+          </p:cNvPr>
+          <p:cNvCxnSpPr>
+            <a:cxnSpLocks/>
+          </p:cNvCxnSpPr>
+          <p:nvPr/>
+        </p:nvCxnSpPr>
+        <p:spPr>
+          <a:xfrm>
+            <a:off x="8339564" y="856527"/>
+            <a:ext cx="0" cy="5185458"/>
+          </a:xfrm>
+          <a:prstGeom prst="line">
+            <a:avLst/>
+          </a:prstGeom>
+          <a:ln>
+            <a:solidFill>
+              <a:schemeClr val="tx1"/>
+            </a:solidFill>
+          </a:ln>
+        </p:spPr>
+        <p:style>
+          <a:lnRef idx="1">
+            <a:schemeClr val="accent1"/>
+          </a:lnRef>
+          <a:fillRef idx="0">
+            <a:schemeClr val="accent1"/>
+          </a:fillRef>
+          <a:effectRef idx="0">
+            <a:schemeClr val="accent1"/>
+          </a:effectRef>
+          <a:fontRef idx="minor">
+            <a:schemeClr val="tx1"/>
+          </a:fontRef>
+        </p:style>
+      </p:cxnSp>
     </p:spTree>
     <p:extLst>
       <p:ext uri="{BB962C8B-B14F-4D97-AF65-F5344CB8AC3E}">
@@ -9848,7 +9866,7 @@
           </p:nvPr>
         </p:nvGraphicFramePr>
         <p:xfrm>
-          <a:off x="2032000" y="719666"/>
+          <a:off x="5080000" y="719668"/>
           <a:ext cx="8128000" cy="5418667"/>
         </p:xfrm>
         <a:graphic>
@@ -9873,7 +9891,7 @@
 <file path=ppt/theme/theme1.xml><?xml version="1.0" encoding="utf-8"?>
 <a:theme xmlns:a="http://schemas.openxmlformats.org/drawingml/2006/main" name="Office Theme">
   <a:themeElements>
-    <a:clrScheme name="Office">
+    <a:clrScheme name="Office Theme">
       <a:dk1>
         <a:sysClr val="windowText" lastClr="000000"/>
       </a:dk1>
@@ -9911,7 +9929,7 @@
         <a:srgbClr val="954F72"/>
       </a:folHlink>
     </a:clrScheme>
-    <a:fontScheme name="Office">
+    <a:fontScheme name="Office Theme">
       <a:majorFont>
         <a:latin typeface="Calibri Light" panose="020F0302020204030204"/>
         <a:ea typeface=""/>
@@ -9946,23 +9964,6 @@
         <a:font script="Viet" typeface="Times New Roman"/>
         <a:font script="Uigh" typeface="Microsoft Uighur"/>
         <a:font script="Geor" typeface="Sylfaen"/>
-        <a:font script="Armn" typeface="Arial"/>
-        <a:font script="Bugi" typeface="Leelawadee UI"/>
-        <a:font script="Bopo" typeface="Microsoft JhengHei"/>
-        <a:font script="Java" typeface="Javanese Text"/>
-        <a:font script="Lisu" typeface="Segoe UI"/>
-        <a:font script="Mymr" typeface="Myanmar Text"/>
-        <a:font script="Nkoo" typeface="Ebrima"/>
-        <a:font script="Olck" typeface="Nirmala UI"/>
-        <a:font script="Osma" typeface="Ebrima"/>
-        <a:font script="Phag" typeface="Phagspa"/>
-        <a:font script="Syrn" typeface="Estrangelo Edessa"/>
-        <a:font script="Syrj" typeface="Estrangelo Edessa"/>
-        <a:font script="Syre" typeface="Estrangelo Edessa"/>
-        <a:font script="Sora" typeface="Nirmala UI"/>
-        <a:font script="Tale" typeface="Microsoft Tai Le"/>
-        <a:font script="Talu" typeface="Microsoft New Tai Lue"/>
-        <a:font script="Tfng" typeface="Ebrima"/>
       </a:majorFont>
       <a:minorFont>
         <a:latin typeface="Calibri" panose="020F0502020204030204"/>
@@ -9998,26 +9999,9 @@
         <a:font script="Viet" typeface="Arial"/>
         <a:font script="Uigh" typeface="Microsoft Uighur"/>
         <a:font script="Geor" typeface="Sylfaen"/>
-        <a:font script="Armn" typeface="Arial"/>
-        <a:font script="Bugi" typeface="Leelawadee UI"/>
-        <a:font script="Bopo" typeface="Microsoft JhengHei"/>
-        <a:font script="Java" typeface="Javanese Text"/>
-        <a:font script="Lisu" typeface="Segoe UI"/>
-        <a:font script="Mymr" typeface="Myanmar Text"/>
-        <a:font script="Nkoo" typeface="Ebrima"/>
-        <a:font script="Olck" typeface="Nirmala UI"/>
-        <a:font script="Osma" typeface="Ebrima"/>
-        <a:font script="Phag" typeface="Phagspa"/>
-        <a:font script="Syrn" typeface="Estrangelo Edessa"/>
-        <a:font script="Syrj" typeface="Estrangelo Edessa"/>
-        <a:font script="Syre" typeface="Estrangelo Edessa"/>
-        <a:font script="Sora" typeface="Nirmala UI"/>
-        <a:font script="Tale" typeface="Microsoft Tai Le"/>
-        <a:font script="Talu" typeface="Microsoft New Tai Lue"/>
-        <a:font script="Tfng" typeface="Ebrima"/>
       </a:minorFont>
     </a:fontScheme>
-    <a:fmtScheme name="Office">
+    <a:fmtScheme name="Office Theme">
       <a:fillStyleLst>
         <a:solidFill>
           <a:schemeClr val="phClr"/>

</xml_diff>